<commit_message>
Added a new file for the ablation study
</commit_message>
<xml_diff>
--- a/Agent/ICSA26.pptx
+++ b/Agent/ICSA26.pptx
@@ -204,7 +204,7 @@
           <a:p>
             <a:fld id="{28969827-7A52-E846-A985-BA418795AE7E}" type="datetimeFigureOut">
               <a:rPr lang="it-IT" smtClean="0"/>
-              <a:t>22/10/25</a:t>
+              <a:t>27/10/25</a:t>
             </a:fld>
             <a:endParaRPr lang="it-IT"/>
           </a:p>
@@ -800,7 +800,7 @@
           <a:p>
             <a:fld id="{F7780F00-E3F4-264D-8668-8D6905897A40}" type="datetimeFigureOut">
               <a:rPr lang="it-IT" smtClean="0"/>
-              <a:t>22/10/25</a:t>
+              <a:t>27/10/25</a:t>
             </a:fld>
             <a:endParaRPr lang="it-IT"/>
           </a:p>
@@ -998,7 +998,7 @@
           <a:p>
             <a:fld id="{F7780F00-E3F4-264D-8668-8D6905897A40}" type="datetimeFigureOut">
               <a:rPr lang="it-IT" smtClean="0"/>
-              <a:t>22/10/25</a:t>
+              <a:t>27/10/25</a:t>
             </a:fld>
             <a:endParaRPr lang="it-IT"/>
           </a:p>
@@ -1206,7 +1206,7 @@
           <a:p>
             <a:fld id="{F7780F00-E3F4-264D-8668-8D6905897A40}" type="datetimeFigureOut">
               <a:rPr lang="it-IT" smtClean="0"/>
-              <a:t>22/10/25</a:t>
+              <a:t>27/10/25</a:t>
             </a:fld>
             <a:endParaRPr lang="it-IT"/>
           </a:p>
@@ -1404,7 +1404,7 @@
           <a:p>
             <a:fld id="{F7780F00-E3F4-264D-8668-8D6905897A40}" type="datetimeFigureOut">
               <a:rPr lang="it-IT" smtClean="0"/>
-              <a:t>22/10/25</a:t>
+              <a:t>27/10/25</a:t>
             </a:fld>
             <a:endParaRPr lang="it-IT"/>
           </a:p>
@@ -1679,7 +1679,7 @@
           <a:p>
             <a:fld id="{F7780F00-E3F4-264D-8668-8D6905897A40}" type="datetimeFigureOut">
               <a:rPr lang="it-IT" smtClean="0"/>
-              <a:t>22/10/25</a:t>
+              <a:t>27/10/25</a:t>
             </a:fld>
             <a:endParaRPr lang="it-IT"/>
           </a:p>
@@ -1944,7 +1944,7 @@
           <a:p>
             <a:fld id="{F7780F00-E3F4-264D-8668-8D6905897A40}" type="datetimeFigureOut">
               <a:rPr lang="it-IT" smtClean="0"/>
-              <a:t>22/10/25</a:t>
+              <a:t>27/10/25</a:t>
             </a:fld>
             <a:endParaRPr lang="it-IT"/>
           </a:p>
@@ -2356,7 +2356,7 @@
           <a:p>
             <a:fld id="{F7780F00-E3F4-264D-8668-8D6905897A40}" type="datetimeFigureOut">
               <a:rPr lang="it-IT" smtClean="0"/>
-              <a:t>22/10/25</a:t>
+              <a:t>27/10/25</a:t>
             </a:fld>
             <a:endParaRPr lang="it-IT"/>
           </a:p>
@@ -2497,7 +2497,7 @@
           <a:p>
             <a:fld id="{F7780F00-E3F4-264D-8668-8D6905897A40}" type="datetimeFigureOut">
               <a:rPr lang="it-IT" smtClean="0"/>
-              <a:t>22/10/25</a:t>
+              <a:t>27/10/25</a:t>
             </a:fld>
             <a:endParaRPr lang="it-IT"/>
           </a:p>
@@ -2610,7 +2610,7 @@
           <a:p>
             <a:fld id="{F7780F00-E3F4-264D-8668-8D6905897A40}" type="datetimeFigureOut">
               <a:rPr lang="it-IT" smtClean="0"/>
-              <a:t>22/10/25</a:t>
+              <a:t>27/10/25</a:t>
             </a:fld>
             <a:endParaRPr lang="it-IT"/>
           </a:p>
@@ -2921,7 +2921,7 @@
           <a:p>
             <a:fld id="{F7780F00-E3F4-264D-8668-8D6905897A40}" type="datetimeFigureOut">
               <a:rPr lang="it-IT" smtClean="0"/>
-              <a:t>22/10/25</a:t>
+              <a:t>27/10/25</a:t>
             </a:fld>
             <a:endParaRPr lang="it-IT"/>
           </a:p>
@@ -3209,7 +3209,7 @@
           <a:p>
             <a:fld id="{F7780F00-E3F4-264D-8668-8D6905897A40}" type="datetimeFigureOut">
               <a:rPr lang="it-IT" smtClean="0"/>
-              <a:t>22/10/25</a:t>
+              <a:t>27/10/25</a:t>
             </a:fld>
             <a:endParaRPr lang="it-IT"/>
           </a:p>
@@ -3450,7 +3450,7 @@
           <a:p>
             <a:fld id="{F7780F00-E3F4-264D-8668-8D6905897A40}" type="datetimeFigureOut">
               <a:rPr lang="it-IT" smtClean="0"/>
-              <a:t>22/10/25</a:t>
+              <a:t>27/10/25</a:t>
             </a:fld>
             <a:endParaRPr lang="it-IT"/>
           </a:p>
@@ -10622,1918 +10622,407 @@
           <a:chExt cx="0" cy="0"/>
         </a:xfrm>
       </p:grpSpPr>
-      <p:grpSp>
-        <p:nvGrpSpPr>
-          <p:cNvPr id="70" name="Gruppo 69">
-            <a:extLst>
-              <a:ext uri="{FF2B5EF4-FFF2-40B4-BE49-F238E27FC236}">
-                <a16:creationId xmlns:a16="http://schemas.microsoft.com/office/drawing/2014/main" id="{CC6FCABE-71B8-0D61-38A7-02F1242C5F77}"/>
-              </a:ext>
-            </a:extLst>
-          </p:cNvPr>
-          <p:cNvGrpSpPr/>
+      <p:pic>
+        <p:nvPicPr>
+          <p:cNvPr id="2" name="Immagine 1">
+            <a:extLst>
+              <a:ext uri="{FF2B5EF4-FFF2-40B4-BE49-F238E27FC236}">
+                <a16:creationId xmlns:a16="http://schemas.microsoft.com/office/drawing/2014/main" id="{B1250EC3-A780-C87E-C971-562BF27CED60}"/>
+              </a:ext>
+            </a:extLst>
+          </p:cNvPr>
+          <p:cNvPicPr>
+            <a:picLocks noChangeAspect="1"/>
+          </p:cNvPicPr>
           <p:nvPr/>
-        </p:nvGrpSpPr>
-        <p:grpSpPr>
-          <a:xfrm flipH="1">
-            <a:off x="121032" y="278370"/>
-            <a:ext cx="5563418" cy="2992646"/>
-            <a:chOff x="901320" y="948930"/>
-            <a:chExt cx="5563418" cy="2992646"/>
-          </a:xfrm>
-        </p:grpSpPr>
-        <p:pic>
-          <p:nvPicPr>
-            <p:cNvPr id="45" name="Immagine 44">
-              <a:extLst>
-                <a:ext uri="{FF2B5EF4-FFF2-40B4-BE49-F238E27FC236}">
-                  <a16:creationId xmlns:a16="http://schemas.microsoft.com/office/drawing/2014/main" id="{396A4423-3713-DADD-BC8C-F1ED2EFF8425}"/>
-                </a:ext>
-              </a:extLst>
-            </p:cNvPr>
-            <p:cNvPicPr>
-              <a:picLocks noChangeAspect="1"/>
-            </p:cNvPicPr>
-            <p:nvPr/>
-          </p:nvPicPr>
-          <p:blipFill>
-            <a:blip r:embed="rId2"/>
-            <a:stretch>
-              <a:fillRect/>
-            </a:stretch>
-          </p:blipFill>
-          <p:spPr>
-            <a:xfrm>
-              <a:off x="1449022" y="948930"/>
-              <a:ext cx="539068" cy="539068"/>
-            </a:xfrm>
-            <a:prstGeom prst="rect">
-              <a:avLst/>
-            </a:prstGeom>
-          </p:spPr>
-        </p:pic>
-        <p:pic>
-          <p:nvPicPr>
-            <p:cNvPr id="46" name="Immagine 45">
-              <a:extLst>
-                <a:ext uri="{FF2B5EF4-FFF2-40B4-BE49-F238E27FC236}">
-                  <a16:creationId xmlns:a16="http://schemas.microsoft.com/office/drawing/2014/main" id="{0505FB2F-BE2C-8A2B-1D8E-F046E4FBFBC3}"/>
-                </a:ext>
-              </a:extLst>
-            </p:cNvPr>
-            <p:cNvPicPr>
-              <a:picLocks noChangeAspect="1"/>
-            </p:cNvPicPr>
-            <p:nvPr/>
-          </p:nvPicPr>
-          <p:blipFill>
-            <a:blip r:embed="rId3"/>
-            <a:stretch>
-              <a:fillRect/>
-            </a:stretch>
-          </p:blipFill>
-          <p:spPr>
-            <a:xfrm>
-              <a:off x="3481906" y="1830113"/>
-              <a:ext cx="609600" cy="609600"/>
-            </a:xfrm>
-            <a:prstGeom prst="rect">
-              <a:avLst/>
-            </a:prstGeom>
-          </p:spPr>
-        </p:pic>
-        <p:sp>
-          <p:nvSpPr>
-            <p:cNvPr id="47" name="CasellaDiTesto 46">
-              <a:extLst>
-                <a:ext uri="{FF2B5EF4-FFF2-40B4-BE49-F238E27FC236}">
-                  <a16:creationId xmlns:a16="http://schemas.microsoft.com/office/drawing/2014/main" id="{23812ACF-7D23-D1BA-62C5-62B5BA243EEF}"/>
-                </a:ext>
-              </a:extLst>
-            </p:cNvPr>
-            <p:cNvSpPr txBox="1"/>
-            <p:nvPr/>
-          </p:nvSpPr>
-          <p:spPr>
-            <a:xfrm>
-              <a:off x="2969470" y="2444722"/>
-              <a:ext cx="1634472" cy="523220"/>
-            </a:xfrm>
-            <a:prstGeom prst="rect">
-              <a:avLst/>
-            </a:prstGeom>
-            <a:noFill/>
-          </p:spPr>
-          <p:txBody>
-            <a:bodyPr wrap="square" rtlCol="0">
-              <a:spAutoFit/>
-            </a:bodyPr>
-            <a:lstStyle/>
-            <a:p>
-              <a:pPr algn="ctr"/>
-              <a:r>
-                <a:rPr lang="it-IT" sz="1400" b="1" dirty="0">
-                  <a:latin typeface="CMU SERIF ROMAN" panose="02000603000000000000" pitchFamily="2" charset="0"/>
-                  <a:ea typeface="CMU SERIF ROMAN" panose="02000603000000000000" pitchFamily="2" charset="0"/>
-                  <a:cs typeface="CMU SERIF ROMAN" panose="02000603000000000000" pitchFamily="2" charset="0"/>
-                </a:rPr>
-                <a:t>Coordinator</a:t>
-              </a:r>
-            </a:p>
-            <a:p>
-              <a:pPr algn="ctr"/>
-              <a:r>
-                <a:rPr lang="it-IT" sz="1400" b="1" dirty="0">
-                  <a:latin typeface="CMU SERIF ROMAN" panose="02000603000000000000" pitchFamily="2" charset="0"/>
-                  <a:ea typeface="CMU SERIF ROMAN" panose="02000603000000000000" pitchFamily="2" charset="0"/>
-                  <a:cs typeface="CMU SERIF ROMAN" panose="02000603000000000000" pitchFamily="2" charset="0"/>
-                </a:rPr>
-                <a:t>Agent</a:t>
-              </a:r>
-            </a:p>
-          </p:txBody>
-        </p:sp>
-        <p:sp>
-          <p:nvSpPr>
-            <p:cNvPr id="48" name="CasellaDiTesto 47">
-              <a:extLst>
-                <a:ext uri="{FF2B5EF4-FFF2-40B4-BE49-F238E27FC236}">
-                  <a16:creationId xmlns:a16="http://schemas.microsoft.com/office/drawing/2014/main" id="{F1F490EB-35A9-C869-EEC1-CBB683C6A766}"/>
-                </a:ext>
-              </a:extLst>
-            </p:cNvPr>
-            <p:cNvSpPr txBox="1"/>
-            <p:nvPr/>
-          </p:nvSpPr>
-          <p:spPr>
-            <a:xfrm>
-              <a:off x="901320" y="1512925"/>
-              <a:ext cx="1634472" cy="307777"/>
-            </a:xfrm>
-            <a:prstGeom prst="rect">
-              <a:avLst/>
-            </a:prstGeom>
-            <a:noFill/>
-          </p:spPr>
-          <p:txBody>
-            <a:bodyPr wrap="square" rtlCol="0">
-              <a:spAutoFit/>
-            </a:bodyPr>
-            <a:lstStyle/>
-            <a:p>
-              <a:pPr algn="ctr"/>
-              <a:r>
-                <a:rPr lang="it-IT" sz="1400" b="1" dirty="0">
-                  <a:latin typeface="CMU SERIF ROMAN" panose="02000603000000000000" pitchFamily="2" charset="0"/>
-                  <a:ea typeface="CMU SERIF ROMAN" panose="02000603000000000000" pitchFamily="2" charset="0"/>
-                  <a:cs typeface="CMU SERIF ROMAN" panose="02000603000000000000" pitchFamily="2" charset="0"/>
-                </a:rPr>
-                <a:t>Agent 1</a:t>
-              </a:r>
-            </a:p>
-          </p:txBody>
-        </p:sp>
-        <p:pic>
-          <p:nvPicPr>
-            <p:cNvPr id="49" name="Immagine 48">
-              <a:extLst>
-                <a:ext uri="{FF2B5EF4-FFF2-40B4-BE49-F238E27FC236}">
-                  <a16:creationId xmlns:a16="http://schemas.microsoft.com/office/drawing/2014/main" id="{BD9B1861-6339-D396-A023-E1A8A3257BC1}"/>
-                </a:ext>
-              </a:extLst>
-            </p:cNvPr>
-            <p:cNvPicPr>
-              <a:picLocks noChangeAspect="1"/>
-            </p:cNvPicPr>
-            <p:nvPr/>
-          </p:nvPicPr>
-          <p:blipFill>
-            <a:blip r:embed="rId2"/>
-            <a:stretch>
-              <a:fillRect/>
-            </a:stretch>
-          </p:blipFill>
-          <p:spPr>
-            <a:xfrm>
-              <a:off x="1449022" y="2009367"/>
-              <a:ext cx="539068" cy="539068"/>
-            </a:xfrm>
-            <a:prstGeom prst="rect">
-              <a:avLst/>
-            </a:prstGeom>
-          </p:spPr>
-        </p:pic>
-        <p:sp>
-          <p:nvSpPr>
-            <p:cNvPr id="50" name="CasellaDiTesto 49">
-              <a:extLst>
-                <a:ext uri="{FF2B5EF4-FFF2-40B4-BE49-F238E27FC236}">
-                  <a16:creationId xmlns:a16="http://schemas.microsoft.com/office/drawing/2014/main" id="{01919E60-F35F-7D96-7962-43D634333E5E}"/>
-                </a:ext>
-              </a:extLst>
-            </p:cNvPr>
-            <p:cNvSpPr txBox="1"/>
-            <p:nvPr/>
-          </p:nvSpPr>
-          <p:spPr>
-            <a:xfrm>
-              <a:off x="901320" y="2573362"/>
-              <a:ext cx="1634472" cy="307777"/>
-            </a:xfrm>
-            <a:prstGeom prst="rect">
-              <a:avLst/>
-            </a:prstGeom>
-            <a:noFill/>
-          </p:spPr>
-          <p:txBody>
-            <a:bodyPr wrap="square" rtlCol="0">
-              <a:spAutoFit/>
-            </a:bodyPr>
-            <a:lstStyle/>
-            <a:p>
-              <a:pPr algn="ctr"/>
-              <a:r>
-                <a:rPr lang="it-IT" sz="1400" b="1" dirty="0">
-                  <a:latin typeface="CMU SERIF ROMAN" panose="02000603000000000000" pitchFamily="2" charset="0"/>
-                  <a:ea typeface="CMU SERIF ROMAN" panose="02000603000000000000" pitchFamily="2" charset="0"/>
-                  <a:cs typeface="CMU SERIF ROMAN" panose="02000603000000000000" pitchFamily="2" charset="0"/>
-                </a:rPr>
-                <a:t>Agent 2</a:t>
-              </a:r>
-            </a:p>
-          </p:txBody>
-        </p:sp>
-        <p:pic>
-          <p:nvPicPr>
-            <p:cNvPr id="51" name="Immagine 50">
-              <a:extLst>
-                <a:ext uri="{FF2B5EF4-FFF2-40B4-BE49-F238E27FC236}">
-                  <a16:creationId xmlns:a16="http://schemas.microsoft.com/office/drawing/2014/main" id="{008C1715-AA4F-E980-4846-05B896975BD8}"/>
-                </a:ext>
-              </a:extLst>
-            </p:cNvPr>
-            <p:cNvPicPr>
-              <a:picLocks noChangeAspect="1"/>
-            </p:cNvPicPr>
-            <p:nvPr/>
-          </p:nvPicPr>
-          <p:blipFill>
-            <a:blip r:embed="rId2"/>
-            <a:stretch>
-              <a:fillRect/>
-            </a:stretch>
-          </p:blipFill>
-          <p:spPr>
-            <a:xfrm>
-              <a:off x="1449022" y="3069804"/>
-              <a:ext cx="539068" cy="539068"/>
-            </a:xfrm>
-            <a:prstGeom prst="rect">
-              <a:avLst/>
-            </a:prstGeom>
-          </p:spPr>
-        </p:pic>
-        <p:sp>
-          <p:nvSpPr>
-            <p:cNvPr id="52" name="CasellaDiTesto 51">
-              <a:extLst>
-                <a:ext uri="{FF2B5EF4-FFF2-40B4-BE49-F238E27FC236}">
-                  <a16:creationId xmlns:a16="http://schemas.microsoft.com/office/drawing/2014/main" id="{E3205BDA-254E-EF51-EDFB-77D2362E7F0D}"/>
-                </a:ext>
-              </a:extLst>
-            </p:cNvPr>
-            <p:cNvSpPr txBox="1"/>
-            <p:nvPr/>
-          </p:nvSpPr>
-          <p:spPr>
-            <a:xfrm>
-              <a:off x="901320" y="3633799"/>
-              <a:ext cx="1634472" cy="307777"/>
-            </a:xfrm>
-            <a:prstGeom prst="rect">
-              <a:avLst/>
-            </a:prstGeom>
-            <a:noFill/>
-          </p:spPr>
-          <p:txBody>
-            <a:bodyPr wrap="square" rtlCol="0">
-              <a:spAutoFit/>
-            </a:bodyPr>
-            <a:lstStyle/>
-            <a:p>
-              <a:pPr algn="ctr"/>
-              <a:r>
-                <a:rPr lang="it-IT" sz="1400" b="1" dirty="0">
-                  <a:latin typeface="CMU SERIF ROMAN" panose="02000603000000000000" pitchFamily="2" charset="0"/>
-                  <a:ea typeface="CMU SERIF ROMAN" panose="02000603000000000000" pitchFamily="2" charset="0"/>
-                  <a:cs typeface="CMU SERIF ROMAN" panose="02000603000000000000" pitchFamily="2" charset="0"/>
-                </a:rPr>
-                <a:t>Agent </a:t>
-              </a:r>
-              <a:r>
-                <a:rPr lang="it-IT" sz="1400" b="1" dirty="0" err="1">
-                  <a:latin typeface="CMU SERIF ROMAN" panose="02000603000000000000" pitchFamily="2" charset="0"/>
-                  <a:ea typeface="CMU SERIF ROMAN" panose="02000603000000000000" pitchFamily="2" charset="0"/>
-                  <a:cs typeface="CMU SERIF ROMAN" panose="02000603000000000000" pitchFamily="2" charset="0"/>
-                </a:rPr>
-                <a:t>n</a:t>
-              </a:r>
-              <a:endParaRPr lang="it-IT" sz="1400" b="1" dirty="0">
-                <a:latin typeface="CMU SERIF ROMAN" panose="02000603000000000000" pitchFamily="2" charset="0"/>
-                <a:ea typeface="CMU SERIF ROMAN" panose="02000603000000000000" pitchFamily="2" charset="0"/>
-                <a:cs typeface="CMU SERIF ROMAN" panose="02000603000000000000" pitchFamily="2" charset="0"/>
-              </a:endParaRPr>
-            </a:p>
-          </p:txBody>
-        </p:sp>
-        <p:cxnSp>
-          <p:nvCxnSpPr>
-            <p:cNvPr id="53" name="Connettore 1 55">
-              <a:extLst>
-                <a:ext uri="{FF2B5EF4-FFF2-40B4-BE49-F238E27FC236}">
-                  <a16:creationId xmlns:a16="http://schemas.microsoft.com/office/drawing/2014/main" id="{891F1A1A-23A5-713B-96D8-D254484EC32D}"/>
-                </a:ext>
-              </a:extLst>
-            </p:cNvPr>
-            <p:cNvCxnSpPr>
-              <a:cxnSpLocks/>
-            </p:cNvCxnSpPr>
-            <p:nvPr/>
-          </p:nvCxnSpPr>
-          <p:spPr>
-            <a:xfrm>
-              <a:off x="2215790" y="1367186"/>
-              <a:ext cx="909928" cy="605834"/>
-            </a:xfrm>
-            <a:prstGeom prst="line">
-              <a:avLst/>
-            </a:prstGeom>
-            <a:ln w="12700" cap="rnd">
-              <a:tailEnd type="arrow"/>
-            </a:ln>
-          </p:spPr>
-          <p:style>
-            <a:lnRef idx="1">
-              <a:schemeClr val="dk1"/>
-            </a:lnRef>
-            <a:fillRef idx="0">
-              <a:schemeClr val="dk1"/>
-            </a:fillRef>
-            <a:effectRef idx="0">
-              <a:schemeClr val="dk1"/>
-            </a:effectRef>
-            <a:fontRef idx="minor">
-              <a:schemeClr val="tx1"/>
-            </a:fontRef>
-          </p:style>
-        </p:cxnSp>
-        <p:cxnSp>
-          <p:nvCxnSpPr>
-            <p:cNvPr id="54" name="Connettore 1 55">
-              <a:extLst>
-                <a:ext uri="{FF2B5EF4-FFF2-40B4-BE49-F238E27FC236}">
-                  <a16:creationId xmlns:a16="http://schemas.microsoft.com/office/drawing/2014/main" id="{1FDDFAF2-3BC7-263E-70BB-CF0A9ABE5156}"/>
-                </a:ext>
-              </a:extLst>
-            </p:cNvPr>
-            <p:cNvCxnSpPr>
-              <a:cxnSpLocks/>
-            </p:cNvCxnSpPr>
-            <p:nvPr/>
-          </p:nvCxnSpPr>
-          <p:spPr>
-            <a:xfrm>
-              <a:off x="2126051" y="2463576"/>
-              <a:ext cx="1007416" cy="0"/>
-            </a:xfrm>
-            <a:prstGeom prst="line">
-              <a:avLst/>
-            </a:prstGeom>
-            <a:ln w="12700" cap="rnd">
-              <a:tailEnd type="arrow"/>
-            </a:ln>
-          </p:spPr>
-          <p:style>
-            <a:lnRef idx="1">
-              <a:schemeClr val="dk1"/>
-            </a:lnRef>
-            <a:fillRef idx="0">
-              <a:schemeClr val="dk1"/>
-            </a:fillRef>
-            <a:effectRef idx="0">
-              <a:schemeClr val="dk1"/>
-            </a:effectRef>
-            <a:fontRef idx="minor">
-              <a:schemeClr val="tx1"/>
-            </a:fontRef>
-          </p:style>
-        </p:cxnSp>
-        <p:cxnSp>
-          <p:nvCxnSpPr>
-            <p:cNvPr id="55" name="Connettore 1 52">
-              <a:extLst>
-                <a:ext uri="{FF2B5EF4-FFF2-40B4-BE49-F238E27FC236}">
-                  <a16:creationId xmlns:a16="http://schemas.microsoft.com/office/drawing/2014/main" id="{EA6A25E0-7379-EC14-2C6D-B7FA1B112819}"/>
-                </a:ext>
-              </a:extLst>
-            </p:cNvPr>
-            <p:cNvCxnSpPr>
-              <a:cxnSpLocks/>
-            </p:cNvCxnSpPr>
-            <p:nvPr/>
-          </p:nvCxnSpPr>
-          <p:spPr>
-            <a:xfrm flipV="1">
-              <a:off x="2236141" y="2886609"/>
-              <a:ext cx="905075" cy="565836"/>
-            </a:xfrm>
-            <a:prstGeom prst="line">
-              <a:avLst/>
-            </a:prstGeom>
-            <a:ln w="12700" cap="rnd">
-              <a:tailEnd type="arrow"/>
-            </a:ln>
-          </p:spPr>
-          <p:style>
-            <a:lnRef idx="1">
-              <a:schemeClr val="dk1"/>
-            </a:lnRef>
-            <a:fillRef idx="0">
-              <a:schemeClr val="dk1"/>
-            </a:fillRef>
-            <a:effectRef idx="0">
-              <a:schemeClr val="dk1"/>
-            </a:effectRef>
-            <a:fontRef idx="minor">
-              <a:schemeClr val="tx1"/>
-            </a:fontRef>
-          </p:style>
-        </p:cxnSp>
-        <p:cxnSp>
-          <p:nvCxnSpPr>
-            <p:cNvPr id="56" name="Connettore 1 55">
-              <a:extLst>
-                <a:ext uri="{FF2B5EF4-FFF2-40B4-BE49-F238E27FC236}">
-                  <a16:creationId xmlns:a16="http://schemas.microsoft.com/office/drawing/2014/main" id="{63A0AB5E-50BA-C18D-96C8-949CDBB8498D}"/>
-                </a:ext>
-              </a:extLst>
-            </p:cNvPr>
-            <p:cNvCxnSpPr>
-              <a:cxnSpLocks/>
-            </p:cNvCxnSpPr>
-            <p:nvPr/>
-          </p:nvCxnSpPr>
-          <p:spPr>
-            <a:xfrm>
-              <a:off x="4389236" y="2534806"/>
-              <a:ext cx="750754" cy="0"/>
-            </a:xfrm>
-            <a:prstGeom prst="line">
-              <a:avLst/>
-            </a:prstGeom>
-            <a:ln w="12700" cap="rnd">
-              <a:tailEnd type="arrow"/>
-            </a:ln>
-          </p:spPr>
-          <p:style>
-            <a:lnRef idx="1">
-              <a:schemeClr val="dk1"/>
-            </a:lnRef>
-            <a:fillRef idx="0">
-              <a:schemeClr val="dk1"/>
-            </a:fillRef>
-            <a:effectRef idx="0">
-              <a:schemeClr val="dk1"/>
-            </a:effectRef>
-            <a:fontRef idx="minor">
-              <a:schemeClr val="tx1"/>
-            </a:fontRef>
-          </p:style>
-        </p:cxnSp>
-        <p:cxnSp>
-          <p:nvCxnSpPr>
-            <p:cNvPr id="57" name="Connettore 1 55">
-              <a:extLst>
-                <a:ext uri="{FF2B5EF4-FFF2-40B4-BE49-F238E27FC236}">
-                  <a16:creationId xmlns:a16="http://schemas.microsoft.com/office/drawing/2014/main" id="{1DF25D74-9362-CCC1-E6B9-395E49DFF38B}"/>
-                </a:ext>
-              </a:extLst>
-            </p:cNvPr>
-            <p:cNvCxnSpPr>
-              <a:cxnSpLocks/>
-            </p:cNvCxnSpPr>
-            <p:nvPr/>
-          </p:nvCxnSpPr>
-          <p:spPr>
-            <a:xfrm flipH="1">
-              <a:off x="4389236" y="2347730"/>
-              <a:ext cx="701940" cy="0"/>
-            </a:xfrm>
-            <a:prstGeom prst="line">
-              <a:avLst/>
-            </a:prstGeom>
-            <a:ln w="12700" cap="rnd">
-              <a:tailEnd type="arrow"/>
-            </a:ln>
-          </p:spPr>
-          <p:style>
-            <a:lnRef idx="1">
-              <a:schemeClr val="dk1"/>
-            </a:lnRef>
-            <a:fillRef idx="0">
-              <a:schemeClr val="dk1"/>
-            </a:fillRef>
-            <a:effectRef idx="0">
-              <a:schemeClr val="dk1"/>
-            </a:effectRef>
-            <a:fontRef idx="minor">
-              <a:schemeClr val="tx1"/>
-            </a:fontRef>
-          </p:style>
-        </p:cxnSp>
-        <p:sp>
-          <p:nvSpPr>
-            <p:cNvPr id="58" name="CasellaDiTesto 57">
-              <a:extLst>
-                <a:ext uri="{FF2B5EF4-FFF2-40B4-BE49-F238E27FC236}">
-                  <a16:creationId xmlns:a16="http://schemas.microsoft.com/office/drawing/2014/main" id="{67BD1555-8F76-4FEB-EF30-FBA665058A58}"/>
-                </a:ext>
-              </a:extLst>
-            </p:cNvPr>
-            <p:cNvSpPr txBox="1"/>
-            <p:nvPr/>
-          </p:nvSpPr>
-          <p:spPr>
-            <a:xfrm>
-              <a:off x="1886281" y="2230918"/>
-              <a:ext cx="1634472" cy="261610"/>
-            </a:xfrm>
-            <a:prstGeom prst="rect">
-              <a:avLst/>
-            </a:prstGeom>
-            <a:noFill/>
-          </p:spPr>
-          <p:txBody>
-            <a:bodyPr wrap="square" rtlCol="0">
-              <a:spAutoFit/>
-            </a:bodyPr>
-            <a:lstStyle/>
-            <a:p>
-              <a:pPr algn="ctr"/>
-              <a:r>
-                <a:rPr lang="it-IT" sz="1100" i="1" dirty="0">
-                  <a:latin typeface="CMU SERIF ROMAN" panose="02000603000000000000" pitchFamily="2" charset="0"/>
-                  <a:ea typeface="CMU SERIF ROMAN" panose="02000603000000000000" pitchFamily="2" charset="0"/>
-                  <a:cs typeface="CMU SERIF ROMAN" panose="02000603000000000000" pitchFamily="2" charset="0"/>
-                </a:rPr>
-                <a:t>Submit vote</a:t>
-              </a:r>
-            </a:p>
-          </p:txBody>
-        </p:sp>
-        <p:sp>
-          <p:nvSpPr>
-            <p:cNvPr id="59" name="CasellaDiTesto 58">
-              <a:extLst>
-                <a:ext uri="{FF2B5EF4-FFF2-40B4-BE49-F238E27FC236}">
-                  <a16:creationId xmlns:a16="http://schemas.microsoft.com/office/drawing/2014/main" id="{5EAB42E1-0C16-396A-41C5-0B3F4613354B}"/>
-                </a:ext>
-              </a:extLst>
-            </p:cNvPr>
-            <p:cNvSpPr txBox="1"/>
-            <p:nvPr/>
-          </p:nvSpPr>
-          <p:spPr>
-            <a:xfrm>
-              <a:off x="3922970" y="2564338"/>
-              <a:ext cx="1634472" cy="261610"/>
-            </a:xfrm>
-            <a:prstGeom prst="rect">
-              <a:avLst/>
-            </a:prstGeom>
-            <a:noFill/>
-          </p:spPr>
-          <p:txBody>
-            <a:bodyPr wrap="square" rtlCol="0">
-              <a:spAutoFit/>
-            </a:bodyPr>
-            <a:lstStyle/>
-            <a:p>
-              <a:pPr algn="ctr"/>
-              <a:r>
-                <a:rPr lang="it-IT" sz="1100" i="1" dirty="0">
-                  <a:latin typeface="CMU SERIF ROMAN" panose="02000603000000000000" pitchFamily="2" charset="0"/>
-                  <a:ea typeface="CMU SERIF ROMAN" panose="02000603000000000000" pitchFamily="2" charset="0"/>
-                  <a:cs typeface="CMU SERIF ROMAN" panose="02000603000000000000" pitchFamily="2" charset="0"/>
-                </a:rPr>
-                <a:t>Result</a:t>
-              </a:r>
-            </a:p>
-          </p:txBody>
-        </p:sp>
-        <p:sp>
-          <p:nvSpPr>
-            <p:cNvPr id="60" name="CasellaDiTesto 59">
-              <a:extLst>
-                <a:ext uri="{FF2B5EF4-FFF2-40B4-BE49-F238E27FC236}">
-                  <a16:creationId xmlns:a16="http://schemas.microsoft.com/office/drawing/2014/main" id="{00717C35-FE31-AC49-E8B0-4E5AA598DFF3}"/>
-                </a:ext>
-              </a:extLst>
-            </p:cNvPr>
-            <p:cNvSpPr txBox="1"/>
-            <p:nvPr/>
-          </p:nvSpPr>
-          <p:spPr>
-            <a:xfrm>
-              <a:off x="3947377" y="2035988"/>
-              <a:ext cx="1634472" cy="261610"/>
-            </a:xfrm>
-            <a:prstGeom prst="rect">
-              <a:avLst/>
-            </a:prstGeom>
-            <a:noFill/>
-          </p:spPr>
-          <p:txBody>
-            <a:bodyPr wrap="square" rtlCol="0">
-              <a:spAutoFit/>
-            </a:bodyPr>
-            <a:lstStyle/>
-            <a:p>
-              <a:pPr algn="ctr"/>
-              <a:r>
-                <a:rPr lang="it-IT" sz="1100" i="1" dirty="0">
-                  <a:latin typeface="CMU SERIF ROMAN" panose="02000603000000000000" pitchFamily="2" charset="0"/>
-                  <a:ea typeface="CMU SERIF ROMAN" panose="02000603000000000000" pitchFamily="2" charset="0"/>
-                  <a:cs typeface="CMU SERIF ROMAN" panose="02000603000000000000" pitchFamily="2" charset="0"/>
-                </a:rPr>
-                <a:t>Prompt</a:t>
-              </a:r>
-            </a:p>
-          </p:txBody>
-        </p:sp>
-        <p:pic>
-          <p:nvPicPr>
-            <p:cNvPr id="61" name="Immagine 60">
-              <a:extLst>
-                <a:ext uri="{FF2B5EF4-FFF2-40B4-BE49-F238E27FC236}">
-                  <a16:creationId xmlns:a16="http://schemas.microsoft.com/office/drawing/2014/main" id="{773F31CF-DC95-F24D-EEE9-75DD6A41F8CE}"/>
-                </a:ext>
-              </a:extLst>
-            </p:cNvPr>
-            <p:cNvPicPr>
-              <a:picLocks noChangeAspect="1"/>
-            </p:cNvPicPr>
-            <p:nvPr/>
-          </p:nvPicPr>
-          <p:blipFill>
-            <a:blip r:embed="rId4"/>
-            <a:stretch>
-              <a:fillRect/>
-            </a:stretch>
-          </p:blipFill>
-          <p:spPr>
-            <a:xfrm>
-              <a:off x="5319369" y="1954524"/>
-              <a:ext cx="635000" cy="635000"/>
-            </a:xfrm>
-            <a:prstGeom prst="rect">
-              <a:avLst/>
-            </a:prstGeom>
-          </p:spPr>
-        </p:pic>
-        <p:sp>
-          <p:nvSpPr>
-            <p:cNvPr id="62" name="CasellaDiTesto 61">
-              <a:extLst>
-                <a:ext uri="{FF2B5EF4-FFF2-40B4-BE49-F238E27FC236}">
-                  <a16:creationId xmlns:a16="http://schemas.microsoft.com/office/drawing/2014/main" id="{97636CB6-51AA-5B8C-CF64-9B169D8B4112}"/>
-                </a:ext>
-              </a:extLst>
-            </p:cNvPr>
-            <p:cNvSpPr txBox="1"/>
-            <p:nvPr/>
-          </p:nvSpPr>
-          <p:spPr>
-            <a:xfrm>
-              <a:off x="4830266" y="2546452"/>
-              <a:ext cx="1634472" cy="307777"/>
-            </a:xfrm>
-            <a:prstGeom prst="rect">
-              <a:avLst/>
-            </a:prstGeom>
-            <a:noFill/>
-          </p:spPr>
-          <p:txBody>
-            <a:bodyPr wrap="square" rtlCol="0">
-              <a:spAutoFit/>
-            </a:bodyPr>
-            <a:lstStyle/>
-            <a:p>
-              <a:pPr algn="ctr"/>
-              <a:r>
-                <a:rPr lang="it-IT" sz="1400" b="1" dirty="0">
-                  <a:latin typeface="CMU SERIF ROMAN" panose="02000603000000000000" pitchFamily="2" charset="0"/>
-                  <a:ea typeface="CMU SERIF ROMAN" panose="02000603000000000000" pitchFamily="2" charset="0"/>
-                  <a:cs typeface="CMU SERIF ROMAN" panose="02000603000000000000" pitchFamily="2" charset="0"/>
-                </a:rPr>
-                <a:t>Tool</a:t>
-              </a:r>
-            </a:p>
-          </p:txBody>
-        </p:sp>
-        <p:pic>
-          <p:nvPicPr>
-            <p:cNvPr id="63" name="Immagine 62">
-              <a:extLst>
-                <a:ext uri="{FF2B5EF4-FFF2-40B4-BE49-F238E27FC236}">
-                  <a16:creationId xmlns:a16="http://schemas.microsoft.com/office/drawing/2014/main" id="{A9B2A39C-BBF2-086F-CA29-62798FDCFDA7}"/>
-                </a:ext>
-              </a:extLst>
-            </p:cNvPr>
-            <p:cNvPicPr>
-              <a:picLocks noChangeAspect="1"/>
-            </p:cNvPicPr>
-            <p:nvPr/>
-          </p:nvPicPr>
-          <p:blipFill>
-            <a:blip r:embed="rId5"/>
-            <a:stretch>
-              <a:fillRect/>
-            </a:stretch>
-          </p:blipFill>
-          <p:spPr>
-            <a:xfrm>
-              <a:off x="4625218" y="2824541"/>
-              <a:ext cx="261610" cy="261610"/>
-            </a:xfrm>
-            <a:prstGeom prst="rect">
-              <a:avLst/>
-            </a:prstGeom>
-          </p:spPr>
-        </p:pic>
-        <p:pic>
-          <p:nvPicPr>
-            <p:cNvPr id="64" name="Immagine 63">
-              <a:extLst>
-                <a:ext uri="{FF2B5EF4-FFF2-40B4-BE49-F238E27FC236}">
-                  <a16:creationId xmlns:a16="http://schemas.microsoft.com/office/drawing/2014/main" id="{AFC187FB-8276-E3E2-878C-254EF034EF10}"/>
-                </a:ext>
-              </a:extLst>
-            </p:cNvPr>
-            <p:cNvPicPr>
-              <a:picLocks noChangeAspect="1"/>
-            </p:cNvPicPr>
-            <p:nvPr/>
-          </p:nvPicPr>
-          <p:blipFill>
-            <a:blip r:embed="rId6"/>
-            <a:stretch>
-              <a:fillRect/>
-            </a:stretch>
-          </p:blipFill>
-          <p:spPr>
-            <a:xfrm>
-              <a:off x="4634432" y="1775549"/>
-              <a:ext cx="279824" cy="279824"/>
-            </a:xfrm>
-            <a:prstGeom prst="rect">
-              <a:avLst/>
-            </a:prstGeom>
-          </p:spPr>
-        </p:pic>
-        <p:pic>
-          <p:nvPicPr>
-            <p:cNvPr id="65" name="Immagine 64">
-              <a:extLst>
-                <a:ext uri="{FF2B5EF4-FFF2-40B4-BE49-F238E27FC236}">
-                  <a16:creationId xmlns:a16="http://schemas.microsoft.com/office/drawing/2014/main" id="{73AA4805-80ED-09E1-259E-A59A4D88CA54}"/>
-                </a:ext>
-              </a:extLst>
-            </p:cNvPr>
-            <p:cNvPicPr>
-              <a:picLocks noChangeAspect="1"/>
-            </p:cNvPicPr>
-            <p:nvPr/>
-          </p:nvPicPr>
-          <p:blipFill>
-            <a:blip r:embed="rId7"/>
-            <a:stretch>
-              <a:fillRect/>
-            </a:stretch>
-          </p:blipFill>
-          <p:spPr>
-            <a:xfrm>
-              <a:off x="2078272" y="2212467"/>
-              <a:ext cx="245008" cy="245008"/>
-            </a:xfrm>
-            <a:prstGeom prst="rect">
-              <a:avLst/>
-            </a:prstGeom>
-          </p:spPr>
-        </p:pic>
-        <p:sp>
-          <p:nvSpPr>
-            <p:cNvPr id="66" name="CasellaDiTesto 65">
-              <a:extLst>
-                <a:ext uri="{FF2B5EF4-FFF2-40B4-BE49-F238E27FC236}">
-                  <a16:creationId xmlns:a16="http://schemas.microsoft.com/office/drawing/2014/main" id="{7A47AE97-B82C-9913-47F5-2A5885D441D9}"/>
-                </a:ext>
-              </a:extLst>
-            </p:cNvPr>
-            <p:cNvSpPr txBox="1"/>
-            <p:nvPr/>
-          </p:nvSpPr>
-          <p:spPr>
-            <a:xfrm rot="19646011">
-              <a:off x="1866966" y="2917240"/>
-              <a:ext cx="1634472" cy="261610"/>
-            </a:xfrm>
-            <a:prstGeom prst="rect">
-              <a:avLst/>
-            </a:prstGeom>
-            <a:noFill/>
-          </p:spPr>
-          <p:txBody>
-            <a:bodyPr wrap="square" rtlCol="0">
-              <a:spAutoFit/>
-            </a:bodyPr>
-            <a:lstStyle/>
-            <a:p>
-              <a:pPr algn="ctr"/>
-              <a:r>
-                <a:rPr lang="it-IT" sz="1100" i="1" dirty="0">
-                  <a:latin typeface="CMU SERIF ROMAN" panose="02000603000000000000" pitchFamily="2" charset="0"/>
-                  <a:ea typeface="CMU SERIF ROMAN" panose="02000603000000000000" pitchFamily="2" charset="0"/>
-                  <a:cs typeface="CMU SERIF ROMAN" panose="02000603000000000000" pitchFamily="2" charset="0"/>
-                </a:rPr>
-                <a:t>Submit vote</a:t>
-              </a:r>
-            </a:p>
-          </p:txBody>
-        </p:sp>
-        <p:pic>
-          <p:nvPicPr>
-            <p:cNvPr id="67" name="Immagine 66">
-              <a:extLst>
-                <a:ext uri="{FF2B5EF4-FFF2-40B4-BE49-F238E27FC236}">
-                  <a16:creationId xmlns:a16="http://schemas.microsoft.com/office/drawing/2014/main" id="{B1463423-3924-87DB-8CFD-2EDA0264A098}"/>
-                </a:ext>
-              </a:extLst>
-            </p:cNvPr>
-            <p:cNvPicPr>
-              <a:picLocks noChangeAspect="1"/>
-            </p:cNvPicPr>
-            <p:nvPr/>
-          </p:nvPicPr>
-          <p:blipFill>
-            <a:blip r:embed="rId7"/>
-            <a:stretch>
-              <a:fillRect/>
-            </a:stretch>
-          </p:blipFill>
-          <p:spPr>
-            <a:xfrm rot="19566245">
-              <a:off x="2113637" y="3165408"/>
-              <a:ext cx="245008" cy="245008"/>
-            </a:xfrm>
-            <a:prstGeom prst="rect">
-              <a:avLst/>
-            </a:prstGeom>
-          </p:spPr>
-        </p:pic>
-        <p:sp>
-          <p:nvSpPr>
-            <p:cNvPr id="68" name="CasellaDiTesto 67">
-              <a:extLst>
-                <a:ext uri="{FF2B5EF4-FFF2-40B4-BE49-F238E27FC236}">
-                  <a16:creationId xmlns:a16="http://schemas.microsoft.com/office/drawing/2014/main" id="{238ED326-7648-FAAE-7BA7-26D3CEA7E166}"/>
-                </a:ext>
-              </a:extLst>
-            </p:cNvPr>
-            <p:cNvSpPr txBox="1"/>
-            <p:nvPr/>
-          </p:nvSpPr>
-          <p:spPr>
-            <a:xfrm rot="2033710">
-              <a:off x="1941528" y="1491688"/>
-              <a:ext cx="1634472" cy="261610"/>
-            </a:xfrm>
-            <a:prstGeom prst="rect">
-              <a:avLst/>
-            </a:prstGeom>
-            <a:noFill/>
-          </p:spPr>
-          <p:txBody>
-            <a:bodyPr wrap="square" rtlCol="0">
-              <a:spAutoFit/>
-            </a:bodyPr>
-            <a:lstStyle/>
-            <a:p>
-              <a:pPr algn="ctr"/>
-              <a:r>
-                <a:rPr lang="it-IT" sz="1100" i="1" dirty="0">
-                  <a:latin typeface="CMU SERIF ROMAN" panose="02000603000000000000" pitchFamily="2" charset="0"/>
-                  <a:ea typeface="CMU SERIF ROMAN" panose="02000603000000000000" pitchFamily="2" charset="0"/>
-                  <a:cs typeface="CMU SERIF ROMAN" panose="02000603000000000000" pitchFamily="2" charset="0"/>
-                </a:rPr>
-                <a:t>Submit vote</a:t>
-              </a:r>
-            </a:p>
-          </p:txBody>
-        </p:sp>
-        <p:pic>
-          <p:nvPicPr>
-            <p:cNvPr id="69" name="Immagine 68">
-              <a:extLst>
-                <a:ext uri="{FF2B5EF4-FFF2-40B4-BE49-F238E27FC236}">
-                  <a16:creationId xmlns:a16="http://schemas.microsoft.com/office/drawing/2014/main" id="{19AD1D4B-DF72-0709-AE17-3B9E3BF878AA}"/>
-                </a:ext>
-              </a:extLst>
-            </p:cNvPr>
-            <p:cNvPicPr>
-              <a:picLocks noChangeAspect="1"/>
-            </p:cNvPicPr>
-            <p:nvPr/>
-          </p:nvPicPr>
-          <p:blipFill>
-            <a:blip r:embed="rId7"/>
-            <a:stretch>
-              <a:fillRect/>
-            </a:stretch>
-          </p:blipFill>
-          <p:spPr>
-            <a:xfrm rot="2205567">
-              <a:off x="2253638" y="1175599"/>
-              <a:ext cx="245008" cy="245008"/>
-            </a:xfrm>
-            <a:prstGeom prst="rect">
-              <a:avLst/>
-            </a:prstGeom>
-          </p:spPr>
-        </p:pic>
-      </p:grpSp>
-      <p:grpSp>
-        <p:nvGrpSpPr>
-          <p:cNvPr id="97" name="Gruppo 96">
-            <a:extLst>
-              <a:ext uri="{FF2B5EF4-FFF2-40B4-BE49-F238E27FC236}">
-                <a16:creationId xmlns:a16="http://schemas.microsoft.com/office/drawing/2014/main" id="{BB99D805-AA0B-F47E-7CC8-F1E6B7E99004}"/>
-              </a:ext>
-            </a:extLst>
-          </p:cNvPr>
-          <p:cNvGrpSpPr/>
+        </p:nvPicPr>
+        <p:blipFill>
+          <a:blip r:embed="rId2"/>
+          <a:srcRect l="7390" t="7613" r="7234" b="9530"/>
+          <a:stretch>
+            <a:fillRect/>
+          </a:stretch>
+        </p:blipFill>
+        <p:spPr>
+          <a:xfrm>
+            <a:off x="1311639" y="1506511"/>
+            <a:ext cx="2743200" cy="3177915"/>
+          </a:xfrm>
+          <a:prstGeom prst="rect">
+            <a:avLst/>
+          </a:prstGeom>
+        </p:spPr>
+      </p:pic>
+      <p:sp>
+        <p:nvSpPr>
+          <p:cNvPr id="4" name="Oval 56">
+            <a:extLst>
+              <a:ext uri="{FF2B5EF4-FFF2-40B4-BE49-F238E27FC236}">
+                <a16:creationId xmlns:a16="http://schemas.microsoft.com/office/drawing/2014/main" id="{967F7DD0-BBD9-3EF2-AC13-EE1A45E2D6B5}"/>
+              </a:ext>
+            </a:extLst>
+          </p:cNvPr>
+          <p:cNvSpPr/>
           <p:nvPr/>
-        </p:nvGrpSpPr>
-        <p:grpSpPr>
-          <a:xfrm flipH="1">
-            <a:off x="6356371" y="705456"/>
-            <a:ext cx="4892668" cy="2222168"/>
-            <a:chOff x="6356371" y="705456"/>
-            <a:chExt cx="4892668" cy="2222168"/>
-          </a:xfrm>
-        </p:grpSpPr>
-        <p:pic>
-          <p:nvPicPr>
-            <p:cNvPr id="71" name="Immagine 70">
-              <a:extLst>
-                <a:ext uri="{FF2B5EF4-FFF2-40B4-BE49-F238E27FC236}">
-                  <a16:creationId xmlns:a16="http://schemas.microsoft.com/office/drawing/2014/main" id="{E21AA119-CA08-B43A-3170-A20AF7AF8053}"/>
-                </a:ext>
-              </a:extLst>
-            </p:cNvPr>
-            <p:cNvPicPr>
-              <a:picLocks noChangeAspect="1"/>
-            </p:cNvPicPr>
-            <p:nvPr/>
-          </p:nvPicPr>
-          <p:blipFill>
-            <a:blip r:embed="rId2"/>
-            <a:stretch>
-              <a:fillRect/>
-            </a:stretch>
-          </p:blipFill>
-          <p:spPr>
-            <a:xfrm>
-              <a:off x="6904073" y="789476"/>
-              <a:ext cx="539068" cy="539068"/>
-            </a:xfrm>
-            <a:prstGeom prst="rect">
-              <a:avLst/>
-            </a:prstGeom>
-          </p:spPr>
-        </p:pic>
-        <p:sp>
-          <p:nvSpPr>
-            <p:cNvPr id="72" name="CasellaDiTesto 71">
-              <a:extLst>
-                <a:ext uri="{FF2B5EF4-FFF2-40B4-BE49-F238E27FC236}">
-                  <a16:creationId xmlns:a16="http://schemas.microsoft.com/office/drawing/2014/main" id="{AE0A62E0-946B-D23B-00F3-C72AC85038ED}"/>
-                </a:ext>
-              </a:extLst>
-            </p:cNvPr>
-            <p:cNvSpPr txBox="1"/>
-            <p:nvPr/>
-          </p:nvSpPr>
-          <p:spPr>
-            <a:xfrm>
-              <a:off x="6356371" y="1314726"/>
-              <a:ext cx="1634472" cy="307777"/>
-            </a:xfrm>
-            <a:prstGeom prst="rect">
-              <a:avLst/>
-            </a:prstGeom>
-            <a:noFill/>
-          </p:spPr>
-          <p:txBody>
-            <a:bodyPr wrap="square" rtlCol="0">
-              <a:spAutoFit/>
-            </a:bodyPr>
-            <a:lstStyle/>
-            <a:p>
-              <a:pPr algn="ctr"/>
-              <a:r>
-                <a:rPr lang="it-IT" sz="1400" b="1" dirty="0">
-                  <a:latin typeface="CMU SERIF ROMAN" panose="02000603000000000000" pitchFamily="2" charset="0"/>
-                  <a:ea typeface="CMU SERIF ROMAN" panose="02000603000000000000" pitchFamily="2" charset="0"/>
-                  <a:cs typeface="CMU SERIF ROMAN" panose="02000603000000000000" pitchFamily="2" charset="0"/>
-                </a:rPr>
-                <a:t>Agent 1</a:t>
-              </a:r>
-            </a:p>
-          </p:txBody>
-        </p:sp>
-        <p:pic>
-          <p:nvPicPr>
-            <p:cNvPr id="73" name="Immagine 72">
-              <a:extLst>
-                <a:ext uri="{FF2B5EF4-FFF2-40B4-BE49-F238E27FC236}">
-                  <a16:creationId xmlns:a16="http://schemas.microsoft.com/office/drawing/2014/main" id="{27D35DD9-AE20-12C2-EF41-430F14D3B954}"/>
-                </a:ext>
-              </a:extLst>
-            </p:cNvPr>
-            <p:cNvPicPr>
-              <a:picLocks noChangeAspect="1"/>
-            </p:cNvPicPr>
-            <p:nvPr/>
-          </p:nvPicPr>
-          <p:blipFill>
-            <a:blip r:embed="rId2"/>
-            <a:stretch>
-              <a:fillRect/>
-            </a:stretch>
-          </p:blipFill>
-          <p:spPr>
-            <a:xfrm>
-              <a:off x="8434774" y="789476"/>
-              <a:ext cx="539068" cy="539068"/>
-            </a:xfrm>
-            <a:prstGeom prst="rect">
-              <a:avLst/>
-            </a:prstGeom>
-          </p:spPr>
-        </p:pic>
-        <p:sp>
-          <p:nvSpPr>
-            <p:cNvPr id="74" name="CasellaDiTesto 73">
-              <a:extLst>
-                <a:ext uri="{FF2B5EF4-FFF2-40B4-BE49-F238E27FC236}">
-                  <a16:creationId xmlns:a16="http://schemas.microsoft.com/office/drawing/2014/main" id="{C5BC17BC-6108-D85F-2F1E-63F246F58C17}"/>
-                </a:ext>
-              </a:extLst>
-            </p:cNvPr>
-            <p:cNvSpPr txBox="1"/>
-            <p:nvPr/>
-          </p:nvSpPr>
-          <p:spPr>
-            <a:xfrm>
-              <a:off x="7887072" y="1314726"/>
-              <a:ext cx="1634472" cy="307777"/>
-            </a:xfrm>
-            <a:prstGeom prst="rect">
-              <a:avLst/>
-            </a:prstGeom>
-            <a:noFill/>
-          </p:spPr>
-          <p:txBody>
-            <a:bodyPr wrap="square" rtlCol="0">
-              <a:spAutoFit/>
-            </a:bodyPr>
-            <a:lstStyle/>
-            <a:p>
-              <a:pPr algn="ctr"/>
-              <a:r>
-                <a:rPr lang="it-IT" sz="1400" b="1" dirty="0">
-                  <a:latin typeface="CMU SERIF ROMAN" panose="02000603000000000000" pitchFamily="2" charset="0"/>
-                  <a:ea typeface="CMU SERIF ROMAN" panose="02000603000000000000" pitchFamily="2" charset="0"/>
-                  <a:cs typeface="CMU SERIF ROMAN" panose="02000603000000000000" pitchFamily="2" charset="0"/>
-                </a:rPr>
-                <a:t>Agent 2</a:t>
-              </a:r>
-            </a:p>
-          </p:txBody>
-        </p:sp>
-        <p:pic>
-          <p:nvPicPr>
-            <p:cNvPr id="75" name="Immagine 74">
-              <a:extLst>
-                <a:ext uri="{FF2B5EF4-FFF2-40B4-BE49-F238E27FC236}">
-                  <a16:creationId xmlns:a16="http://schemas.microsoft.com/office/drawing/2014/main" id="{96D18F6B-DE90-BF79-23EC-4155B3652292}"/>
-                </a:ext>
-              </a:extLst>
-            </p:cNvPr>
-            <p:cNvPicPr>
-              <a:picLocks noChangeAspect="1"/>
-            </p:cNvPicPr>
-            <p:nvPr/>
-          </p:nvPicPr>
-          <p:blipFill>
-            <a:blip r:embed="rId2"/>
-            <a:stretch>
-              <a:fillRect/>
-            </a:stretch>
-          </p:blipFill>
-          <p:spPr>
-            <a:xfrm>
-              <a:off x="7674933" y="2117843"/>
-              <a:ext cx="539068" cy="539068"/>
-            </a:xfrm>
-            <a:prstGeom prst="rect">
-              <a:avLst/>
-            </a:prstGeom>
-          </p:spPr>
-        </p:pic>
-        <p:sp>
-          <p:nvSpPr>
-            <p:cNvPr id="76" name="CasellaDiTesto 75">
-              <a:extLst>
-                <a:ext uri="{FF2B5EF4-FFF2-40B4-BE49-F238E27FC236}">
-                  <a16:creationId xmlns:a16="http://schemas.microsoft.com/office/drawing/2014/main" id="{C19B089C-F365-E66B-9690-A15ACC98C5C7}"/>
-                </a:ext>
-              </a:extLst>
-            </p:cNvPr>
-            <p:cNvSpPr txBox="1"/>
-            <p:nvPr/>
-          </p:nvSpPr>
-          <p:spPr>
-            <a:xfrm>
-              <a:off x="7127231" y="2619846"/>
-              <a:ext cx="1634472" cy="307777"/>
-            </a:xfrm>
-            <a:prstGeom prst="rect">
-              <a:avLst/>
-            </a:prstGeom>
-            <a:noFill/>
-          </p:spPr>
-          <p:txBody>
-            <a:bodyPr wrap="square" rtlCol="0">
-              <a:spAutoFit/>
-            </a:bodyPr>
-            <a:lstStyle/>
-            <a:p>
-              <a:pPr algn="ctr"/>
-              <a:r>
-                <a:rPr lang="it-IT" sz="1400" b="1" dirty="0">
-                  <a:latin typeface="CMU SERIF ROMAN" panose="02000603000000000000" pitchFamily="2" charset="0"/>
-                  <a:ea typeface="CMU SERIF ROMAN" panose="02000603000000000000" pitchFamily="2" charset="0"/>
-                  <a:cs typeface="CMU SERIF ROMAN" panose="02000603000000000000" pitchFamily="2" charset="0"/>
-                </a:rPr>
-                <a:t>Agent </a:t>
-              </a:r>
-              <a:r>
-                <a:rPr lang="it-IT" sz="1400" b="1" dirty="0" err="1">
-                  <a:latin typeface="CMU SERIF ROMAN" panose="02000603000000000000" pitchFamily="2" charset="0"/>
-                  <a:ea typeface="CMU SERIF ROMAN" panose="02000603000000000000" pitchFamily="2" charset="0"/>
-                  <a:cs typeface="CMU SERIF ROMAN" panose="02000603000000000000" pitchFamily="2" charset="0"/>
-                </a:rPr>
-                <a:t>n</a:t>
-              </a:r>
-              <a:endParaRPr lang="it-IT" sz="1400" b="1" dirty="0">
-                <a:latin typeface="CMU SERIF ROMAN" panose="02000603000000000000" pitchFamily="2" charset="0"/>
-                <a:ea typeface="CMU SERIF ROMAN" panose="02000603000000000000" pitchFamily="2" charset="0"/>
-                <a:cs typeface="CMU SERIF ROMAN" panose="02000603000000000000" pitchFamily="2" charset="0"/>
-              </a:endParaRPr>
-            </a:p>
-          </p:txBody>
-        </p:sp>
-        <p:cxnSp>
-          <p:nvCxnSpPr>
-            <p:cNvPr id="77" name="Connettore 1 55">
-              <a:extLst>
-                <a:ext uri="{FF2B5EF4-FFF2-40B4-BE49-F238E27FC236}">
-                  <a16:creationId xmlns:a16="http://schemas.microsoft.com/office/drawing/2014/main" id="{470B7107-33CE-E149-7CD9-2D0A404B93D5}"/>
-                </a:ext>
-              </a:extLst>
-            </p:cNvPr>
-            <p:cNvCxnSpPr>
-              <a:cxnSpLocks/>
-            </p:cNvCxnSpPr>
-            <p:nvPr/>
-          </p:nvCxnSpPr>
-          <p:spPr>
-            <a:xfrm>
-              <a:off x="9284427" y="1931374"/>
-              <a:ext cx="750754" cy="0"/>
-            </a:xfrm>
-            <a:prstGeom prst="line">
-              <a:avLst/>
-            </a:prstGeom>
-            <a:ln w="12700" cap="rnd">
-              <a:tailEnd type="arrow"/>
-            </a:ln>
-          </p:spPr>
-          <p:style>
-            <a:lnRef idx="1">
-              <a:schemeClr val="dk1"/>
-            </a:lnRef>
-            <a:fillRef idx="0">
-              <a:schemeClr val="dk1"/>
-            </a:fillRef>
-            <a:effectRef idx="0">
-              <a:schemeClr val="dk1"/>
-            </a:effectRef>
-            <a:fontRef idx="minor">
-              <a:schemeClr val="tx1"/>
-            </a:fontRef>
-          </p:style>
-        </p:cxnSp>
-        <p:cxnSp>
-          <p:nvCxnSpPr>
-            <p:cNvPr id="78" name="Connettore 1 55">
-              <a:extLst>
-                <a:ext uri="{FF2B5EF4-FFF2-40B4-BE49-F238E27FC236}">
-                  <a16:creationId xmlns:a16="http://schemas.microsoft.com/office/drawing/2014/main" id="{44617333-E41E-D285-4CC7-DA4050CB43E9}"/>
-                </a:ext>
-              </a:extLst>
-            </p:cNvPr>
-            <p:cNvCxnSpPr>
-              <a:cxnSpLocks/>
-            </p:cNvCxnSpPr>
-            <p:nvPr/>
-          </p:nvCxnSpPr>
-          <p:spPr>
-            <a:xfrm flipH="1">
-              <a:off x="9284427" y="1744298"/>
-              <a:ext cx="701940" cy="0"/>
-            </a:xfrm>
-            <a:prstGeom prst="line">
-              <a:avLst/>
-            </a:prstGeom>
-            <a:ln w="12700" cap="rnd">
-              <a:tailEnd type="arrow"/>
-            </a:ln>
-          </p:spPr>
-          <p:style>
-            <a:lnRef idx="1">
-              <a:schemeClr val="dk1"/>
-            </a:lnRef>
-            <a:fillRef idx="0">
-              <a:schemeClr val="dk1"/>
-            </a:fillRef>
-            <a:effectRef idx="0">
-              <a:schemeClr val="dk1"/>
-            </a:effectRef>
-            <a:fontRef idx="minor">
-              <a:schemeClr val="tx1"/>
-            </a:fontRef>
-          </p:style>
-        </p:cxnSp>
-        <p:sp>
-          <p:nvSpPr>
-            <p:cNvPr id="79" name="CasellaDiTesto 78">
-              <a:extLst>
-                <a:ext uri="{FF2B5EF4-FFF2-40B4-BE49-F238E27FC236}">
-                  <a16:creationId xmlns:a16="http://schemas.microsoft.com/office/drawing/2014/main" id="{913925E9-AF37-473D-BBD0-C3B991407D1E}"/>
-                </a:ext>
-              </a:extLst>
-            </p:cNvPr>
-            <p:cNvSpPr txBox="1"/>
-            <p:nvPr/>
-          </p:nvSpPr>
-          <p:spPr>
-            <a:xfrm>
-              <a:off x="8818161" y="1960906"/>
-              <a:ext cx="1634472" cy="261610"/>
-            </a:xfrm>
-            <a:prstGeom prst="rect">
-              <a:avLst/>
-            </a:prstGeom>
-            <a:noFill/>
-          </p:spPr>
-          <p:txBody>
-            <a:bodyPr wrap="square" rtlCol="0">
-              <a:spAutoFit/>
-            </a:bodyPr>
-            <a:lstStyle/>
-            <a:p>
-              <a:pPr algn="ctr"/>
-              <a:r>
-                <a:rPr lang="it-IT" sz="1100" i="1" dirty="0">
-                  <a:latin typeface="CMU SERIF ROMAN" panose="02000603000000000000" pitchFamily="2" charset="0"/>
-                  <a:ea typeface="CMU SERIF ROMAN" panose="02000603000000000000" pitchFamily="2" charset="0"/>
-                  <a:cs typeface="CMU SERIF ROMAN" panose="02000603000000000000" pitchFamily="2" charset="0"/>
-                </a:rPr>
-                <a:t>Result</a:t>
-              </a:r>
-            </a:p>
-          </p:txBody>
-        </p:sp>
-        <p:sp>
-          <p:nvSpPr>
-            <p:cNvPr id="80" name="CasellaDiTesto 79">
-              <a:extLst>
-                <a:ext uri="{FF2B5EF4-FFF2-40B4-BE49-F238E27FC236}">
-                  <a16:creationId xmlns:a16="http://schemas.microsoft.com/office/drawing/2014/main" id="{FAB96F96-7BBE-DF81-4B45-F5F8B8E2FBBE}"/>
-                </a:ext>
-              </a:extLst>
-            </p:cNvPr>
-            <p:cNvSpPr txBox="1"/>
-            <p:nvPr/>
-          </p:nvSpPr>
-          <p:spPr>
-            <a:xfrm>
-              <a:off x="8842568" y="1432556"/>
-              <a:ext cx="1634472" cy="261610"/>
-            </a:xfrm>
-            <a:prstGeom prst="rect">
-              <a:avLst/>
-            </a:prstGeom>
-            <a:noFill/>
-          </p:spPr>
-          <p:txBody>
-            <a:bodyPr wrap="square" rtlCol="0">
-              <a:spAutoFit/>
-            </a:bodyPr>
-            <a:lstStyle/>
-            <a:p>
-              <a:pPr algn="ctr"/>
-              <a:r>
-                <a:rPr lang="it-IT" sz="1100" i="1" dirty="0">
-                  <a:latin typeface="CMU SERIF ROMAN" panose="02000603000000000000" pitchFamily="2" charset="0"/>
-                  <a:ea typeface="CMU SERIF ROMAN" panose="02000603000000000000" pitchFamily="2" charset="0"/>
-                  <a:cs typeface="CMU SERIF ROMAN" panose="02000603000000000000" pitchFamily="2" charset="0"/>
-                </a:rPr>
-                <a:t>Prompt</a:t>
-              </a:r>
-            </a:p>
-          </p:txBody>
-        </p:sp>
-        <p:pic>
-          <p:nvPicPr>
-            <p:cNvPr id="81" name="Immagine 80">
-              <a:extLst>
-                <a:ext uri="{FF2B5EF4-FFF2-40B4-BE49-F238E27FC236}">
-                  <a16:creationId xmlns:a16="http://schemas.microsoft.com/office/drawing/2014/main" id="{1A5F2372-62A6-86FB-3CDB-16EE8DECB607}"/>
-                </a:ext>
-              </a:extLst>
-            </p:cNvPr>
-            <p:cNvPicPr>
-              <a:picLocks noChangeAspect="1"/>
-            </p:cNvPicPr>
-            <p:nvPr/>
-          </p:nvPicPr>
-          <p:blipFill>
-            <a:blip r:embed="rId4"/>
-            <a:stretch>
-              <a:fillRect/>
-            </a:stretch>
-          </p:blipFill>
-          <p:spPr>
-            <a:xfrm>
-              <a:off x="10114303" y="1325612"/>
-              <a:ext cx="635000" cy="635000"/>
-            </a:xfrm>
-            <a:prstGeom prst="rect">
-              <a:avLst/>
-            </a:prstGeom>
-          </p:spPr>
-        </p:pic>
-        <p:pic>
-          <p:nvPicPr>
-            <p:cNvPr id="82" name="Immagine 81">
-              <a:extLst>
-                <a:ext uri="{FF2B5EF4-FFF2-40B4-BE49-F238E27FC236}">
-                  <a16:creationId xmlns:a16="http://schemas.microsoft.com/office/drawing/2014/main" id="{21A4337A-92D7-AAAA-67D5-C4CDB10BA7BF}"/>
-                </a:ext>
-              </a:extLst>
-            </p:cNvPr>
-            <p:cNvPicPr>
-              <a:picLocks noChangeAspect="1"/>
-            </p:cNvPicPr>
-            <p:nvPr/>
-          </p:nvPicPr>
-          <p:blipFill>
-            <a:blip r:embed="rId6"/>
-            <a:stretch>
-              <a:fillRect/>
-            </a:stretch>
-          </p:blipFill>
-          <p:spPr>
-            <a:xfrm>
-              <a:off x="9529623" y="1172117"/>
-              <a:ext cx="279824" cy="279824"/>
-            </a:xfrm>
-            <a:prstGeom prst="rect">
-              <a:avLst/>
-            </a:prstGeom>
-          </p:spPr>
-        </p:pic>
-        <p:sp>
-          <p:nvSpPr>
-            <p:cNvPr id="83" name="Rettangolo con angoli arrotondati 82">
-              <a:extLst>
-                <a:ext uri="{FF2B5EF4-FFF2-40B4-BE49-F238E27FC236}">
-                  <a16:creationId xmlns:a16="http://schemas.microsoft.com/office/drawing/2014/main" id="{35032237-D569-DB7C-8235-44B3300B5AC6}"/>
-                </a:ext>
-              </a:extLst>
-            </p:cNvPr>
-            <p:cNvSpPr/>
-            <p:nvPr/>
-          </p:nvSpPr>
-          <p:spPr>
-            <a:xfrm>
-              <a:off x="6688278" y="705456"/>
-              <a:ext cx="2456121" cy="2222168"/>
-            </a:xfrm>
-            <a:prstGeom prst="roundRect">
-              <a:avLst/>
-            </a:prstGeom>
-            <a:noFill/>
-          </p:spPr>
-          <p:style>
-            <a:lnRef idx="2">
-              <a:schemeClr val="accent1">
-                <a:shade val="15000"/>
+        </p:nvSpPr>
+        <p:spPr>
+          <a:xfrm>
+            <a:off x="3723543" y="2925064"/>
+            <a:ext cx="103182" cy="104350"/>
+          </a:xfrm>
+          <a:prstGeom prst="ellipse">
+            <a:avLst/>
+          </a:prstGeom>
+          <a:noFill/>
+          <a:ln w="6350">
+            <a:solidFill>
+              <a:schemeClr val="bg2">
+                <a:lumMod val="10000"/>
               </a:schemeClr>
-            </a:lnRef>
-            <a:fillRef idx="1">
-              <a:schemeClr val="accent1"/>
-            </a:fillRef>
-            <a:effectRef idx="0">
-              <a:schemeClr val="accent1"/>
-            </a:effectRef>
-            <a:fontRef idx="minor">
-              <a:schemeClr val="lt1"/>
-            </a:fontRef>
-          </p:style>
-          <p:txBody>
-            <a:bodyPr rtlCol="0" anchor="ctr"/>
-            <a:lstStyle/>
-            <a:p>
-              <a:pPr algn="ctr"/>
-              <a:endParaRPr lang="it-IT"/>
-            </a:p>
-          </p:txBody>
-        </p:sp>
-        <p:grpSp>
-          <p:nvGrpSpPr>
-            <p:cNvPr id="84" name="Gruppo 83">
-              <a:extLst>
-                <a:ext uri="{FF2B5EF4-FFF2-40B4-BE49-F238E27FC236}">
-                  <a16:creationId xmlns:a16="http://schemas.microsoft.com/office/drawing/2014/main" id="{7936D926-6991-B60B-AF6E-6A9D1436F6E1}"/>
-                </a:ext>
-              </a:extLst>
-            </p:cNvPr>
-            <p:cNvGrpSpPr/>
-            <p:nvPr/>
-          </p:nvGrpSpPr>
-          <p:grpSpPr>
-            <a:xfrm rot="3073150">
-              <a:off x="7029432" y="1898668"/>
-              <a:ext cx="578240" cy="187076"/>
-              <a:chOff x="619241" y="2178955"/>
-              <a:chExt cx="578240" cy="187076"/>
-            </a:xfrm>
-          </p:grpSpPr>
-          <p:cxnSp>
-            <p:nvCxnSpPr>
-              <p:cNvPr id="85" name="Connettore 1 55">
-                <a:extLst>
-                  <a:ext uri="{FF2B5EF4-FFF2-40B4-BE49-F238E27FC236}">
-                    <a16:creationId xmlns:a16="http://schemas.microsoft.com/office/drawing/2014/main" id="{2509BCC9-8AF8-2B6C-64F3-FB8184B06577}"/>
-                  </a:ext>
-                </a:extLst>
-              </p:cNvPr>
-              <p:cNvCxnSpPr>
-                <a:cxnSpLocks/>
-              </p:cNvCxnSpPr>
-              <p:nvPr/>
-            </p:nvCxnSpPr>
-            <p:spPr>
-              <a:xfrm>
-                <a:off x="629874" y="2366031"/>
-                <a:ext cx="567607" cy="0"/>
-              </a:xfrm>
-              <a:prstGeom prst="line">
-                <a:avLst/>
-              </a:prstGeom>
-              <a:ln w="12700" cap="rnd">
-                <a:tailEnd type="arrow"/>
-              </a:ln>
-            </p:spPr>
-            <p:style>
-              <a:lnRef idx="1">
-                <a:schemeClr val="dk1"/>
-              </a:lnRef>
-              <a:fillRef idx="0">
-                <a:schemeClr val="dk1"/>
-              </a:fillRef>
-              <a:effectRef idx="0">
-                <a:schemeClr val="dk1"/>
-              </a:effectRef>
-              <a:fontRef idx="minor">
-                <a:schemeClr val="tx1"/>
-              </a:fontRef>
-            </p:style>
-          </p:cxnSp>
-          <p:cxnSp>
-            <p:nvCxnSpPr>
-              <p:cNvPr id="86" name="Connettore 1 55">
-                <a:extLst>
-                  <a:ext uri="{FF2B5EF4-FFF2-40B4-BE49-F238E27FC236}">
-                    <a16:creationId xmlns:a16="http://schemas.microsoft.com/office/drawing/2014/main" id="{5FBB78C0-CD8D-4A8D-A76C-3CDD68F88A8B}"/>
-                  </a:ext>
-                </a:extLst>
-              </p:cNvPr>
-              <p:cNvCxnSpPr>
-                <a:cxnSpLocks/>
-              </p:cNvCxnSpPr>
-              <p:nvPr/>
-            </p:nvCxnSpPr>
-            <p:spPr>
-              <a:xfrm flipH="1">
-                <a:off x="619241" y="2178955"/>
-                <a:ext cx="567607" cy="0"/>
-              </a:xfrm>
-              <a:prstGeom prst="line">
-                <a:avLst/>
-              </a:prstGeom>
-              <a:ln w="12700" cap="rnd">
-                <a:tailEnd type="arrow"/>
-              </a:ln>
-            </p:spPr>
-            <p:style>
-              <a:lnRef idx="1">
-                <a:schemeClr val="dk1"/>
-              </a:lnRef>
-              <a:fillRef idx="0">
-                <a:schemeClr val="dk1"/>
-              </a:fillRef>
-              <a:effectRef idx="0">
-                <a:schemeClr val="dk1"/>
-              </a:effectRef>
-              <a:fontRef idx="minor">
-                <a:schemeClr val="tx1"/>
-              </a:fontRef>
-            </p:style>
-          </p:cxnSp>
-        </p:grpSp>
-        <p:grpSp>
-          <p:nvGrpSpPr>
-            <p:cNvPr id="87" name="Gruppo 86">
-              <a:extLst>
-                <a:ext uri="{FF2B5EF4-FFF2-40B4-BE49-F238E27FC236}">
-                  <a16:creationId xmlns:a16="http://schemas.microsoft.com/office/drawing/2014/main" id="{46ECE29C-7FFA-DC86-CD29-1C51EDC62C45}"/>
-                </a:ext>
-              </a:extLst>
-            </p:cNvPr>
-            <p:cNvGrpSpPr/>
-            <p:nvPr/>
-          </p:nvGrpSpPr>
-          <p:grpSpPr>
-            <a:xfrm rot="7393770">
-              <a:off x="8271079" y="1912637"/>
-              <a:ext cx="578240" cy="187076"/>
-              <a:chOff x="619241" y="2178955"/>
-              <a:chExt cx="578240" cy="187076"/>
-            </a:xfrm>
-          </p:grpSpPr>
-          <p:cxnSp>
-            <p:nvCxnSpPr>
-              <p:cNvPr id="88" name="Connettore 1 55">
-                <a:extLst>
-                  <a:ext uri="{FF2B5EF4-FFF2-40B4-BE49-F238E27FC236}">
-                    <a16:creationId xmlns:a16="http://schemas.microsoft.com/office/drawing/2014/main" id="{11760F67-BBE3-A05C-A1F5-43653A6835B9}"/>
-                  </a:ext>
-                </a:extLst>
-              </p:cNvPr>
-              <p:cNvCxnSpPr>
-                <a:cxnSpLocks/>
-              </p:cNvCxnSpPr>
-              <p:nvPr/>
-            </p:nvCxnSpPr>
-            <p:spPr>
-              <a:xfrm>
-                <a:off x="629874" y="2366031"/>
-                <a:ext cx="567607" cy="0"/>
-              </a:xfrm>
-              <a:prstGeom prst="line">
-                <a:avLst/>
-              </a:prstGeom>
-              <a:ln w="12700" cap="rnd">
-                <a:tailEnd type="arrow"/>
-              </a:ln>
-            </p:spPr>
-            <p:style>
-              <a:lnRef idx="1">
-                <a:schemeClr val="dk1"/>
-              </a:lnRef>
-              <a:fillRef idx="0">
-                <a:schemeClr val="dk1"/>
-              </a:fillRef>
-              <a:effectRef idx="0">
-                <a:schemeClr val="dk1"/>
-              </a:effectRef>
-              <a:fontRef idx="minor">
-                <a:schemeClr val="tx1"/>
-              </a:fontRef>
-            </p:style>
-          </p:cxnSp>
-          <p:cxnSp>
-            <p:nvCxnSpPr>
-              <p:cNvPr id="89" name="Connettore 1 55">
-                <a:extLst>
-                  <a:ext uri="{FF2B5EF4-FFF2-40B4-BE49-F238E27FC236}">
-                    <a16:creationId xmlns:a16="http://schemas.microsoft.com/office/drawing/2014/main" id="{E7B8C120-530E-5550-2CC1-FB25074735F6}"/>
-                  </a:ext>
-                </a:extLst>
-              </p:cNvPr>
-              <p:cNvCxnSpPr>
-                <a:cxnSpLocks/>
-              </p:cNvCxnSpPr>
-              <p:nvPr/>
-            </p:nvCxnSpPr>
-            <p:spPr>
-              <a:xfrm flipH="1">
-                <a:off x="619241" y="2178955"/>
-                <a:ext cx="567607" cy="0"/>
-              </a:xfrm>
-              <a:prstGeom prst="line">
-                <a:avLst/>
-              </a:prstGeom>
-              <a:ln w="12700" cap="rnd">
-                <a:tailEnd type="arrow"/>
-              </a:ln>
-            </p:spPr>
-            <p:style>
-              <a:lnRef idx="1">
-                <a:schemeClr val="dk1"/>
-              </a:lnRef>
-              <a:fillRef idx="0">
-                <a:schemeClr val="dk1"/>
-              </a:fillRef>
-              <a:effectRef idx="0">
-                <a:schemeClr val="dk1"/>
-              </a:effectRef>
-              <a:fontRef idx="minor">
-                <a:schemeClr val="tx1"/>
-              </a:fontRef>
-            </p:style>
-          </p:cxnSp>
-        </p:grpSp>
-        <p:grpSp>
-          <p:nvGrpSpPr>
-            <p:cNvPr id="90" name="Gruppo 89">
-              <a:extLst>
-                <a:ext uri="{FF2B5EF4-FFF2-40B4-BE49-F238E27FC236}">
-                  <a16:creationId xmlns:a16="http://schemas.microsoft.com/office/drawing/2014/main" id="{BF6EBB1A-5059-6DF7-FE6B-5847C1034919}"/>
-                </a:ext>
-              </a:extLst>
-            </p:cNvPr>
-            <p:cNvGrpSpPr/>
-            <p:nvPr/>
-          </p:nvGrpSpPr>
-          <p:grpSpPr>
-            <a:xfrm>
-              <a:off x="7649692" y="993945"/>
-              <a:ext cx="578240" cy="187076"/>
-              <a:chOff x="619241" y="2178955"/>
-              <a:chExt cx="578240" cy="187076"/>
-            </a:xfrm>
-          </p:grpSpPr>
-          <p:cxnSp>
-            <p:nvCxnSpPr>
-              <p:cNvPr id="91" name="Connettore 1 55">
-                <a:extLst>
-                  <a:ext uri="{FF2B5EF4-FFF2-40B4-BE49-F238E27FC236}">
-                    <a16:creationId xmlns:a16="http://schemas.microsoft.com/office/drawing/2014/main" id="{D3447F23-173E-B4F8-50B9-9ED39C59397E}"/>
-                  </a:ext>
-                </a:extLst>
-              </p:cNvPr>
-              <p:cNvCxnSpPr>
-                <a:cxnSpLocks/>
-              </p:cNvCxnSpPr>
-              <p:nvPr/>
-            </p:nvCxnSpPr>
-            <p:spPr>
-              <a:xfrm>
-                <a:off x="629874" y="2366031"/>
-                <a:ext cx="567607" cy="0"/>
-              </a:xfrm>
-              <a:prstGeom prst="line">
-                <a:avLst/>
-              </a:prstGeom>
-              <a:ln w="12700" cap="rnd">
-                <a:tailEnd type="arrow"/>
-              </a:ln>
-            </p:spPr>
-            <p:style>
-              <a:lnRef idx="1">
-                <a:schemeClr val="dk1"/>
-              </a:lnRef>
-              <a:fillRef idx="0">
-                <a:schemeClr val="dk1"/>
-              </a:fillRef>
-              <a:effectRef idx="0">
-                <a:schemeClr val="dk1"/>
-              </a:effectRef>
-              <a:fontRef idx="minor">
-                <a:schemeClr val="tx1"/>
-              </a:fontRef>
-            </p:style>
-          </p:cxnSp>
-          <p:cxnSp>
-            <p:nvCxnSpPr>
-              <p:cNvPr id="92" name="Connettore 1 55">
-                <a:extLst>
-                  <a:ext uri="{FF2B5EF4-FFF2-40B4-BE49-F238E27FC236}">
-                    <a16:creationId xmlns:a16="http://schemas.microsoft.com/office/drawing/2014/main" id="{872EBF9A-F5E5-AE1C-B7F0-00B3D7C8F5CC}"/>
-                  </a:ext>
-                </a:extLst>
-              </p:cNvPr>
-              <p:cNvCxnSpPr>
-                <a:cxnSpLocks/>
-              </p:cNvCxnSpPr>
-              <p:nvPr/>
-            </p:nvCxnSpPr>
-            <p:spPr>
-              <a:xfrm flipH="1">
-                <a:off x="619241" y="2178955"/>
-                <a:ext cx="567607" cy="0"/>
-              </a:xfrm>
-              <a:prstGeom prst="line">
-                <a:avLst/>
-              </a:prstGeom>
-              <a:ln w="12700" cap="rnd">
-                <a:tailEnd type="arrow"/>
-              </a:ln>
-            </p:spPr>
-            <p:style>
-              <a:lnRef idx="1">
-                <a:schemeClr val="dk1"/>
-              </a:lnRef>
-              <a:fillRef idx="0">
-                <a:schemeClr val="dk1"/>
-              </a:fillRef>
-              <a:effectRef idx="0">
-                <a:schemeClr val="dk1"/>
-              </a:effectRef>
-              <a:fontRef idx="minor">
-                <a:schemeClr val="tx1"/>
-              </a:fontRef>
-            </p:style>
-          </p:cxnSp>
-        </p:grpSp>
-        <p:pic>
-          <p:nvPicPr>
-            <p:cNvPr id="93" name="Immagine 92">
-              <a:extLst>
-                <a:ext uri="{FF2B5EF4-FFF2-40B4-BE49-F238E27FC236}">
-                  <a16:creationId xmlns:a16="http://schemas.microsoft.com/office/drawing/2014/main" id="{0FF08CD8-862E-324C-B603-BE02F761C763}"/>
-                </a:ext>
-              </a:extLst>
-            </p:cNvPr>
-            <p:cNvPicPr>
-              <a:picLocks noChangeAspect="1"/>
-            </p:cNvPicPr>
-            <p:nvPr/>
-          </p:nvPicPr>
-          <p:blipFill>
-            <a:blip r:embed="rId5"/>
-            <a:stretch>
-              <a:fillRect/>
-            </a:stretch>
-          </p:blipFill>
-          <p:spPr>
-            <a:xfrm>
-              <a:off x="9504592" y="2200103"/>
-              <a:ext cx="261610" cy="261610"/>
-            </a:xfrm>
-            <a:prstGeom prst="rect">
-              <a:avLst/>
-            </a:prstGeom>
-          </p:spPr>
-        </p:pic>
-        <p:pic>
-          <p:nvPicPr>
-            <p:cNvPr id="94" name="Immagine 93">
-              <a:extLst>
-                <a:ext uri="{FF2B5EF4-FFF2-40B4-BE49-F238E27FC236}">
-                  <a16:creationId xmlns:a16="http://schemas.microsoft.com/office/drawing/2014/main" id="{9A20047C-CF88-01A6-284A-A7BF66F8B5CB}"/>
-                </a:ext>
-              </a:extLst>
-            </p:cNvPr>
-            <p:cNvPicPr>
-              <a:picLocks noChangeAspect="1"/>
-            </p:cNvPicPr>
-            <p:nvPr/>
-          </p:nvPicPr>
-          <p:blipFill>
-            <a:blip r:embed="rId8"/>
-            <a:stretch>
-              <a:fillRect/>
-            </a:stretch>
-          </p:blipFill>
-          <p:spPr>
-            <a:xfrm>
-              <a:off x="7793000" y="1466290"/>
-              <a:ext cx="307777" cy="307777"/>
-            </a:xfrm>
-            <a:prstGeom prst="rect">
-              <a:avLst/>
-            </a:prstGeom>
-          </p:spPr>
-        </p:pic>
-        <p:sp>
-          <p:nvSpPr>
-            <p:cNvPr id="95" name="CasellaDiTesto 94">
-              <a:extLst>
-                <a:ext uri="{FF2B5EF4-FFF2-40B4-BE49-F238E27FC236}">
-                  <a16:creationId xmlns:a16="http://schemas.microsoft.com/office/drawing/2014/main" id="{2D2A1D5C-C120-1400-2B0F-201D84B81831}"/>
-                </a:ext>
-              </a:extLst>
-            </p:cNvPr>
-            <p:cNvSpPr txBox="1"/>
-            <p:nvPr/>
-          </p:nvSpPr>
-          <p:spPr>
-            <a:xfrm>
-              <a:off x="7115073" y="1766727"/>
-              <a:ext cx="1634472" cy="261610"/>
-            </a:xfrm>
-            <a:prstGeom prst="rect">
-              <a:avLst/>
-            </a:prstGeom>
-            <a:noFill/>
-          </p:spPr>
-          <p:txBody>
-            <a:bodyPr wrap="square" rtlCol="0">
-              <a:spAutoFit/>
-            </a:bodyPr>
-            <a:lstStyle/>
-            <a:p>
-              <a:pPr algn="ctr"/>
-              <a:r>
-                <a:rPr lang="it-IT" sz="1100" i="1" dirty="0">
-                  <a:latin typeface="CMU SERIF ROMAN" panose="02000603000000000000" pitchFamily="2" charset="0"/>
-                  <a:ea typeface="CMU SERIF ROMAN" panose="02000603000000000000" pitchFamily="2" charset="0"/>
-                  <a:cs typeface="CMU SERIF ROMAN" panose="02000603000000000000" pitchFamily="2" charset="0"/>
-                </a:rPr>
-                <a:t>Debate</a:t>
-              </a:r>
-            </a:p>
-          </p:txBody>
-        </p:sp>
-        <p:sp>
-          <p:nvSpPr>
-            <p:cNvPr id="96" name="CasellaDiTesto 95">
-              <a:extLst>
-                <a:ext uri="{FF2B5EF4-FFF2-40B4-BE49-F238E27FC236}">
-                  <a16:creationId xmlns:a16="http://schemas.microsoft.com/office/drawing/2014/main" id="{44198563-15BA-D397-DF2C-79BC0E6B51FE}"/>
-                </a:ext>
-              </a:extLst>
-            </p:cNvPr>
-            <p:cNvSpPr txBox="1"/>
-            <p:nvPr/>
-          </p:nvSpPr>
-          <p:spPr>
-            <a:xfrm>
-              <a:off x="9614567" y="1940094"/>
-              <a:ext cx="1634472" cy="307777"/>
-            </a:xfrm>
-            <a:prstGeom prst="rect">
-              <a:avLst/>
-            </a:prstGeom>
-            <a:noFill/>
-          </p:spPr>
-          <p:txBody>
-            <a:bodyPr wrap="square" rtlCol="0">
-              <a:spAutoFit/>
-            </a:bodyPr>
-            <a:lstStyle/>
-            <a:p>
-              <a:pPr algn="ctr"/>
-              <a:r>
-                <a:rPr lang="it-IT" sz="1400" b="1" dirty="0">
-                  <a:latin typeface="CMU SERIF ROMAN" panose="02000603000000000000" pitchFamily="2" charset="0"/>
-                  <a:ea typeface="CMU SERIF ROMAN" panose="02000603000000000000" pitchFamily="2" charset="0"/>
-                  <a:cs typeface="CMU SERIF ROMAN" panose="02000603000000000000" pitchFamily="2" charset="0"/>
-                </a:rPr>
-                <a:t>Tool</a:t>
-              </a:r>
-            </a:p>
-          </p:txBody>
-        </p:sp>
-      </p:grpSp>
+            </a:solidFill>
+            <a:prstDash val="solid"/>
+            <a:extLst>
+              <a:ext uri="{C807C97D-BFC1-408E-A445-0C87EB9F89A2}">
+                <ask:lineSketchStyleProps xmlns:ask="http://schemas.microsoft.com/office/drawing/2018/sketchyshapes">
+                  <ask:type>
+                    <ask:lineSketchNone/>
+                  </ask:type>
+                </ask:lineSketchStyleProps>
+              </a:ext>
+            </a:extLst>
+          </a:ln>
+        </p:spPr>
+        <p:style>
+          <a:lnRef idx="2">
+            <a:schemeClr val="accent1">
+              <a:shade val="15000"/>
+            </a:schemeClr>
+          </a:lnRef>
+          <a:fillRef idx="1">
+            <a:schemeClr val="accent1"/>
+          </a:fillRef>
+          <a:effectRef idx="0">
+            <a:schemeClr val="accent1"/>
+          </a:effectRef>
+          <a:fontRef idx="minor">
+            <a:schemeClr val="lt1"/>
+          </a:fontRef>
+        </p:style>
+        <p:txBody>
+          <a:bodyPr rtlCol="0" anchor="ctr"/>
+          <a:lstStyle/>
+          <a:p>
+            <a:pPr algn="ctr"/>
+            <a:r>
+              <a:rPr lang="it-IT" sz="600" dirty="0">
+                <a:solidFill>
+                  <a:schemeClr val="tx1"/>
+                </a:solidFill>
+                <a:latin typeface="CMU Serif" panose="02000603000000000000" pitchFamily="2" charset="0"/>
+                <a:ea typeface="CMU Serif" panose="02000603000000000000" pitchFamily="2" charset="0"/>
+                <a:cs typeface="CMU Serif" panose="02000603000000000000" pitchFamily="2" charset="0"/>
+              </a:rPr>
+              <a:t>2</a:t>
+            </a:r>
+          </a:p>
+        </p:txBody>
+      </p:sp>
+      <p:sp>
+        <p:nvSpPr>
+          <p:cNvPr id="8" name="Oval 56">
+            <a:extLst>
+              <a:ext uri="{FF2B5EF4-FFF2-40B4-BE49-F238E27FC236}">
+                <a16:creationId xmlns:a16="http://schemas.microsoft.com/office/drawing/2014/main" id="{81972138-33C5-3BA1-DD54-6D14981ED282}"/>
+              </a:ext>
+            </a:extLst>
+          </p:cNvPr>
+          <p:cNvSpPr/>
+          <p:nvPr/>
+        </p:nvSpPr>
+        <p:spPr>
+          <a:xfrm>
+            <a:off x="2694722" y="3837909"/>
+            <a:ext cx="103182" cy="104350"/>
+          </a:xfrm>
+          <a:prstGeom prst="ellipse">
+            <a:avLst/>
+          </a:prstGeom>
+          <a:noFill/>
+          <a:ln w="6350">
+            <a:solidFill>
+              <a:schemeClr val="bg2">
+                <a:lumMod val="10000"/>
+              </a:schemeClr>
+            </a:solidFill>
+            <a:prstDash val="solid"/>
+            <a:extLst>
+              <a:ext uri="{C807C97D-BFC1-408E-A445-0C87EB9F89A2}">
+                <ask:lineSketchStyleProps xmlns:ask="http://schemas.microsoft.com/office/drawing/2018/sketchyshapes">
+                  <ask:type>
+                    <ask:lineSketchNone/>
+                  </ask:type>
+                </ask:lineSketchStyleProps>
+              </a:ext>
+            </a:extLst>
+          </a:ln>
+        </p:spPr>
+        <p:style>
+          <a:lnRef idx="2">
+            <a:schemeClr val="accent1">
+              <a:shade val="15000"/>
+            </a:schemeClr>
+          </a:lnRef>
+          <a:fillRef idx="1">
+            <a:schemeClr val="accent1"/>
+          </a:fillRef>
+          <a:effectRef idx="0">
+            <a:schemeClr val="accent1"/>
+          </a:effectRef>
+          <a:fontRef idx="minor">
+            <a:schemeClr val="lt1"/>
+          </a:fontRef>
+        </p:style>
+        <p:txBody>
+          <a:bodyPr rtlCol="0" anchor="ctr"/>
+          <a:lstStyle/>
+          <a:p>
+            <a:pPr algn="ctr"/>
+            <a:r>
+              <a:rPr lang="it-IT" sz="600" dirty="0">
+                <a:solidFill>
+                  <a:schemeClr val="tx1"/>
+                </a:solidFill>
+                <a:latin typeface="CMU Serif" panose="02000603000000000000" pitchFamily="2" charset="0"/>
+                <a:ea typeface="CMU Serif" panose="02000603000000000000" pitchFamily="2" charset="0"/>
+                <a:cs typeface="CMU Serif" panose="02000603000000000000" pitchFamily="2" charset="0"/>
+              </a:rPr>
+              <a:t>5</a:t>
+            </a:r>
+          </a:p>
+        </p:txBody>
+      </p:sp>
+      <p:sp>
+        <p:nvSpPr>
+          <p:cNvPr id="9" name="Oval 56">
+            <a:extLst>
+              <a:ext uri="{FF2B5EF4-FFF2-40B4-BE49-F238E27FC236}">
+                <a16:creationId xmlns:a16="http://schemas.microsoft.com/office/drawing/2014/main" id="{1CD40869-DF0D-DBD4-47E6-A9001F5C5448}"/>
+              </a:ext>
+            </a:extLst>
+          </p:cNvPr>
+          <p:cNvSpPr/>
+          <p:nvPr/>
+        </p:nvSpPr>
+        <p:spPr>
+          <a:xfrm>
+            <a:off x="2182437" y="3419670"/>
+            <a:ext cx="103182" cy="104350"/>
+          </a:xfrm>
+          <a:prstGeom prst="ellipse">
+            <a:avLst/>
+          </a:prstGeom>
+          <a:noFill/>
+          <a:ln w="6350">
+            <a:solidFill>
+              <a:schemeClr val="bg2">
+                <a:lumMod val="10000"/>
+              </a:schemeClr>
+            </a:solidFill>
+            <a:prstDash val="solid"/>
+            <a:extLst>
+              <a:ext uri="{C807C97D-BFC1-408E-A445-0C87EB9F89A2}">
+                <ask:lineSketchStyleProps xmlns:ask="http://schemas.microsoft.com/office/drawing/2018/sketchyshapes">
+                  <ask:type>
+                    <ask:lineSketchNone/>
+                  </ask:type>
+                </ask:lineSketchStyleProps>
+              </a:ext>
+            </a:extLst>
+          </a:ln>
+        </p:spPr>
+        <p:style>
+          <a:lnRef idx="2">
+            <a:schemeClr val="accent1">
+              <a:shade val="15000"/>
+            </a:schemeClr>
+          </a:lnRef>
+          <a:fillRef idx="1">
+            <a:schemeClr val="accent1"/>
+          </a:fillRef>
+          <a:effectRef idx="0">
+            <a:schemeClr val="accent1"/>
+          </a:effectRef>
+          <a:fontRef idx="minor">
+            <a:schemeClr val="lt1"/>
+          </a:fontRef>
+        </p:style>
+        <p:txBody>
+          <a:bodyPr rtlCol="0" anchor="ctr"/>
+          <a:lstStyle/>
+          <a:p>
+            <a:pPr algn="ctr"/>
+            <a:r>
+              <a:rPr lang="it-IT" sz="600" dirty="0">
+                <a:solidFill>
+                  <a:schemeClr val="tx1"/>
+                </a:solidFill>
+                <a:latin typeface="CMU Serif" panose="02000603000000000000" pitchFamily="2" charset="0"/>
+                <a:ea typeface="CMU Serif" panose="02000603000000000000" pitchFamily="2" charset="0"/>
+                <a:cs typeface="CMU Serif" panose="02000603000000000000" pitchFamily="2" charset="0"/>
+              </a:rPr>
+              <a:t>4</a:t>
+            </a:r>
+          </a:p>
+        </p:txBody>
+      </p:sp>
+      <p:sp>
+        <p:nvSpPr>
+          <p:cNvPr id="10" name="Oval 56">
+            <a:extLst>
+              <a:ext uri="{FF2B5EF4-FFF2-40B4-BE49-F238E27FC236}">
+                <a16:creationId xmlns:a16="http://schemas.microsoft.com/office/drawing/2014/main" id="{B47F36C2-8B65-FDD3-96B4-8595E8F96B83}"/>
+              </a:ext>
+            </a:extLst>
+          </p:cNvPr>
+          <p:cNvSpPr/>
+          <p:nvPr/>
+        </p:nvSpPr>
+        <p:spPr>
+          <a:xfrm>
+            <a:off x="1795217" y="2925064"/>
+            <a:ext cx="103182" cy="104350"/>
+          </a:xfrm>
+          <a:prstGeom prst="ellipse">
+            <a:avLst/>
+          </a:prstGeom>
+          <a:noFill/>
+          <a:ln w="6350">
+            <a:solidFill>
+              <a:schemeClr val="bg2">
+                <a:lumMod val="10000"/>
+              </a:schemeClr>
+            </a:solidFill>
+            <a:prstDash val="solid"/>
+            <a:extLst>
+              <a:ext uri="{C807C97D-BFC1-408E-A445-0C87EB9F89A2}">
+                <ask:lineSketchStyleProps xmlns:ask="http://schemas.microsoft.com/office/drawing/2018/sketchyshapes">
+                  <ask:type>
+                    <ask:lineSketchNone/>
+                  </ask:type>
+                </ask:lineSketchStyleProps>
+              </a:ext>
+            </a:extLst>
+          </a:ln>
+        </p:spPr>
+        <p:style>
+          <a:lnRef idx="2">
+            <a:schemeClr val="accent1">
+              <a:shade val="15000"/>
+            </a:schemeClr>
+          </a:lnRef>
+          <a:fillRef idx="1">
+            <a:schemeClr val="accent1"/>
+          </a:fillRef>
+          <a:effectRef idx="0">
+            <a:schemeClr val="accent1"/>
+          </a:effectRef>
+          <a:fontRef idx="minor">
+            <a:schemeClr val="lt1"/>
+          </a:fontRef>
+        </p:style>
+        <p:txBody>
+          <a:bodyPr rtlCol="0" anchor="ctr"/>
+          <a:lstStyle/>
+          <a:p>
+            <a:pPr algn="ctr"/>
+            <a:r>
+              <a:rPr lang="it-IT" sz="600" dirty="0">
+                <a:solidFill>
+                  <a:schemeClr val="tx1"/>
+                </a:solidFill>
+                <a:latin typeface="CMU Serif" panose="02000603000000000000" pitchFamily="2" charset="0"/>
+                <a:ea typeface="CMU Serif" panose="02000603000000000000" pitchFamily="2" charset="0"/>
+                <a:cs typeface="CMU Serif" panose="02000603000000000000" pitchFamily="2" charset="0"/>
+              </a:rPr>
+              <a:t>3</a:t>
+            </a:r>
+          </a:p>
+        </p:txBody>
+      </p:sp>
+      <p:sp>
+        <p:nvSpPr>
+          <p:cNvPr id="11" name="Oval 56">
+            <a:extLst>
+              <a:ext uri="{FF2B5EF4-FFF2-40B4-BE49-F238E27FC236}">
+                <a16:creationId xmlns:a16="http://schemas.microsoft.com/office/drawing/2014/main" id="{08672155-7F80-996C-15E1-A231DD08D281}"/>
+              </a:ext>
+            </a:extLst>
+          </p:cNvPr>
+          <p:cNvSpPr/>
+          <p:nvPr/>
+        </p:nvSpPr>
+        <p:spPr>
+          <a:xfrm>
+            <a:off x="1995824" y="2615599"/>
+            <a:ext cx="103182" cy="104350"/>
+          </a:xfrm>
+          <a:prstGeom prst="ellipse">
+            <a:avLst/>
+          </a:prstGeom>
+          <a:noFill/>
+          <a:ln w="6350">
+            <a:solidFill>
+              <a:schemeClr val="bg2">
+                <a:lumMod val="10000"/>
+              </a:schemeClr>
+            </a:solidFill>
+            <a:prstDash val="solid"/>
+            <a:extLst>
+              <a:ext uri="{C807C97D-BFC1-408E-A445-0C87EB9F89A2}">
+                <ask:lineSketchStyleProps xmlns:ask="http://schemas.microsoft.com/office/drawing/2018/sketchyshapes">
+                  <ask:type>
+                    <ask:lineSketchNone/>
+                  </ask:type>
+                </ask:lineSketchStyleProps>
+              </a:ext>
+            </a:extLst>
+          </a:ln>
+        </p:spPr>
+        <p:style>
+          <a:lnRef idx="2">
+            <a:schemeClr val="accent1">
+              <a:shade val="15000"/>
+            </a:schemeClr>
+          </a:lnRef>
+          <a:fillRef idx="1">
+            <a:schemeClr val="accent1"/>
+          </a:fillRef>
+          <a:effectRef idx="0">
+            <a:schemeClr val="accent1"/>
+          </a:effectRef>
+          <a:fontRef idx="minor">
+            <a:schemeClr val="lt1"/>
+          </a:fontRef>
+        </p:style>
+        <p:txBody>
+          <a:bodyPr rtlCol="0" anchor="ctr"/>
+          <a:lstStyle/>
+          <a:p>
+            <a:pPr algn="ctr"/>
+            <a:r>
+              <a:rPr lang="it-IT" sz="600" dirty="0">
+                <a:solidFill>
+                  <a:schemeClr val="tx1"/>
+                </a:solidFill>
+                <a:latin typeface="CMU Serif" panose="02000603000000000000" pitchFamily="2" charset="0"/>
+                <a:ea typeface="CMU Serif" panose="02000603000000000000" pitchFamily="2" charset="0"/>
+                <a:cs typeface="CMU Serif" panose="02000603000000000000" pitchFamily="2" charset="0"/>
+              </a:rPr>
+              <a:t>1</a:t>
+            </a:r>
+          </a:p>
+        </p:txBody>
+      </p:sp>
     </p:spTree>
     <p:extLst>
       <p:ext uri="{BB962C8B-B14F-4D97-AF65-F5344CB8AC3E}">

</xml_diff>